<commit_message>
sync with en translation
* add ":" to commands in cheatsheet
</commit_message>
<xml_diff>
--- a/presentation/en/Sonic PI Workshop_en.pptx
+++ b/presentation/en/Sonic PI Workshop_en.pptx
@@ -232,7 +232,7 @@
             <a:fld id="{7FD773D1-FC60-4896-8BCC-9B28FBDAB5FD}" type="datetimeFigureOut">
               <a:rPr lang="de-DE" smtClean="0"/>
               <a:pPr/>
-              <a:t>17.04.2016</a:t>
+              <a:t>07.03.18</a:t>
             </a:fld>
             <a:endParaRPr lang="de-DE"/>
           </a:p>
@@ -299,7 +299,7 @@
             <a:fld id="{4E745014-4765-4719-A37A-A6E1AA9B1CBE}" type="slidenum">
               <a:rPr lang="de-DE" smtClean="0"/>
               <a:pPr/>
-              <a:t>‹#›</a:t>
+              <a:t>‹Nr.›</a:t>
             </a:fld>
             <a:endParaRPr lang="de-DE"/>
           </a:p>
@@ -399,7 +399,7 @@
             <a:fld id="{72145D81-8E55-40FC-9585-CFDCFEF92FEB}" type="datetimeFigureOut">
               <a:rPr lang="de-DE" smtClean="0"/>
               <a:pPr/>
-              <a:t>17.04.2016</a:t>
+              <a:t>07.03.18</a:t>
             </a:fld>
             <a:endParaRPr lang="de-DE"/>
           </a:p>
@@ -463,35 +463,35 @@
           <a:p>
             <a:pPr lvl="0"/>
             <a:r>
-              <a:rPr lang="en-US" smtClean="0"/>
+              <a:rPr lang="en-US"/>
               <a:t>Click to edit Master text styles</a:t>
             </a:r>
           </a:p>
           <a:p>
             <a:pPr lvl="1"/>
             <a:r>
-              <a:rPr lang="en-US" smtClean="0"/>
+              <a:rPr lang="en-US"/>
               <a:t>Second level</a:t>
             </a:r>
           </a:p>
           <a:p>
             <a:pPr lvl="2"/>
             <a:r>
-              <a:rPr lang="en-US" smtClean="0"/>
+              <a:rPr lang="en-US"/>
               <a:t>Third level</a:t>
             </a:r>
           </a:p>
           <a:p>
             <a:pPr lvl="3"/>
             <a:r>
-              <a:rPr lang="en-US" smtClean="0"/>
+              <a:rPr lang="en-US"/>
               <a:t>Fourth level</a:t>
             </a:r>
           </a:p>
           <a:p>
             <a:pPr lvl="4"/>
             <a:r>
-              <a:rPr lang="en-US" smtClean="0"/>
+              <a:rPr lang="en-US"/>
               <a:t>Fifth level</a:t>
             </a:r>
             <a:endParaRPr lang="de-DE"/>
@@ -559,7 +559,7 @@
             <a:fld id="{D6E72435-FA90-4640-AFCA-E6A02F5F1494}" type="slidenum">
               <a:rPr lang="de-DE" smtClean="0"/>
               <a:pPr/>
-              <a:t>‹#›</a:t>
+              <a:t>‹Nr.›</a:t>
             </a:fld>
             <a:endParaRPr lang="de-DE"/>
           </a:p>
@@ -895,10 +895,9 @@
           <a:p>
             <a:pPr lvl="0"/>
             <a:r>
-              <a:rPr lang="de-DE" dirty="0" smtClean="0"/>
+              <a:rPr lang="de-DE" dirty="0"/>
               <a:t>Tue</a:t>
             </a:r>
-            <a:endParaRPr lang="de-DE" dirty="0"/>
           </a:p>
         </p:txBody>
       </p:sp>
@@ -951,10 +950,9 @@
           <a:p>
             <a:pPr lvl="0"/>
             <a:r>
-              <a:rPr lang="de-DE" dirty="0" smtClean="0"/>
+              <a:rPr lang="de-DE" dirty="0"/>
               <a:t>Alternatives (use provided tabs)</a:t>
             </a:r>
-            <a:endParaRPr lang="de-DE" dirty="0"/>
           </a:p>
         </p:txBody>
       </p:sp>
@@ -1007,10 +1005,9 @@
           <a:p>
             <a:pPr lvl="0"/>
             <a:r>
-              <a:rPr lang="de-DE" dirty="0" smtClean="0"/>
+              <a:rPr lang="de-DE" dirty="0"/>
               <a:t>Alternatives (use provided tabs)</a:t>
             </a:r>
-            <a:endParaRPr lang="de-DE" dirty="0"/>
           </a:p>
         </p:txBody>
       </p:sp>
@@ -1054,7 +1051,7 @@
           <a:p>
             <a:pPr lvl="0"/>
             <a:r>
-              <a:rPr lang="de-DE" dirty="0" smtClean="0"/>
+              <a:rPr lang="de-DE" dirty="0"/>
               <a:t>Click to add text</a:t>
             </a:r>
           </a:p>
@@ -1100,10 +1097,9 @@
           <a:p>
             <a:pPr lvl="0"/>
             <a:r>
-              <a:rPr lang="de-DE" dirty="0" smtClean="0"/>
+              <a:rPr lang="de-DE" dirty="0"/>
               <a:t>Tue</a:t>
             </a:r>
-            <a:endParaRPr lang="de-DE" dirty="0"/>
           </a:p>
         </p:txBody>
       </p:sp>
@@ -1147,7 +1143,7 @@
           <a:p>
             <a:pPr lvl="0"/>
             <a:r>
-              <a:rPr lang="de-DE" dirty="0" smtClean="0"/>
+              <a:rPr lang="de-DE" dirty="0"/>
               <a:t>Click to add text</a:t>
             </a:r>
           </a:p>
@@ -1158,13 +1154,6 @@
   <p:clrMapOvr>
     <a:masterClrMapping/>
   </p:clrMapOvr>
-  <p:timing>
-    <p:tnLst>
-      <p:par>
-        <p:cTn id="1" dur="indefinite" restart="never" nodeType="tmRoot"/>
-      </p:par>
-    </p:tnLst>
-  </p:timing>
 </p:sldLayout>
 </file>
 
@@ -1225,10 +1214,9 @@
           <a:p>
             <a:pPr lvl="0"/>
             <a:r>
-              <a:rPr lang="de-DE" dirty="0" smtClean="0"/>
+              <a:rPr lang="de-DE" dirty="0"/>
               <a:t>Tue</a:t>
             </a:r>
-            <a:endParaRPr lang="de-DE" dirty="0"/>
           </a:p>
         </p:txBody>
       </p:sp>
@@ -1281,10 +1269,9 @@
           <a:p>
             <a:pPr lvl="0"/>
             <a:r>
-              <a:rPr lang="de-DE" dirty="0" smtClean="0"/>
+              <a:rPr lang="de-DE" dirty="0"/>
               <a:t>Alternatives (use provided tabs)</a:t>
             </a:r>
-            <a:endParaRPr lang="de-DE" dirty="0"/>
           </a:p>
         </p:txBody>
       </p:sp>
@@ -1337,10 +1324,9 @@
           <a:p>
             <a:pPr lvl="0"/>
             <a:r>
-              <a:rPr lang="de-DE" dirty="0" smtClean="0"/>
+              <a:rPr lang="de-DE" dirty="0"/>
               <a:t>Alternatives (use provided tabs)</a:t>
             </a:r>
-            <a:endParaRPr lang="de-DE" dirty="0"/>
           </a:p>
         </p:txBody>
       </p:sp>
@@ -1384,7 +1370,7 @@
           <a:p>
             <a:pPr lvl="0"/>
             <a:r>
-              <a:rPr lang="de-DE" dirty="0" smtClean="0"/>
+              <a:rPr lang="de-DE" dirty="0"/>
               <a:t>Click to add text</a:t>
             </a:r>
           </a:p>
@@ -1430,10 +1416,9 @@
           <a:p>
             <a:pPr lvl="0"/>
             <a:r>
-              <a:rPr lang="de-DE" dirty="0" smtClean="0"/>
+              <a:rPr lang="de-DE" dirty="0"/>
               <a:t>Tue</a:t>
             </a:r>
-            <a:endParaRPr lang="de-DE" dirty="0"/>
           </a:p>
         </p:txBody>
       </p:sp>
@@ -1477,7 +1462,7 @@
           <a:p>
             <a:pPr lvl="0"/>
             <a:r>
-              <a:rPr lang="de-DE" dirty="0" smtClean="0"/>
+              <a:rPr lang="de-DE" dirty="0"/>
               <a:t>Click to add text</a:t>
             </a:r>
           </a:p>
@@ -1493,13 +1478,6 @@
   <p:clrMapOvr>
     <a:masterClrMapping/>
   </p:clrMapOvr>
-  <p:timing>
-    <p:tnLst>
-      <p:par>
-        <p:cTn id="1" dur="indefinite" restart="never" nodeType="tmRoot"/>
-      </p:par>
-    </p:tnLst>
-  </p:timing>
 </p:sldLayout>
 </file>
 
@@ -1560,10 +1538,9 @@
           <a:p>
             <a:pPr lvl="0"/>
             <a:r>
-              <a:rPr lang="de-DE" dirty="0" smtClean="0"/>
+              <a:rPr lang="de-DE" dirty="0"/>
               <a:t>Tue</a:t>
             </a:r>
-            <a:endParaRPr lang="de-DE" dirty="0"/>
           </a:p>
         </p:txBody>
       </p:sp>
@@ -1616,10 +1593,9 @@
           <a:p>
             <a:pPr lvl="0"/>
             <a:r>
-              <a:rPr lang="de-DE" dirty="0" smtClean="0"/>
+              <a:rPr lang="de-DE" dirty="0"/>
               <a:t>Alternatives (use provided tabs)</a:t>
             </a:r>
-            <a:endParaRPr lang="de-DE" dirty="0"/>
           </a:p>
         </p:txBody>
       </p:sp>
@@ -1672,10 +1648,9 @@
           <a:p>
             <a:pPr lvl="0"/>
             <a:r>
-              <a:rPr lang="de-DE" dirty="0" smtClean="0"/>
+              <a:rPr lang="de-DE" dirty="0"/>
               <a:t>Alternatives (use provided tabs)</a:t>
             </a:r>
-            <a:endParaRPr lang="de-DE" dirty="0"/>
           </a:p>
         </p:txBody>
       </p:sp>
@@ -1719,7 +1694,7 @@
           <a:p>
             <a:pPr lvl="0"/>
             <a:r>
-              <a:rPr lang="de-DE" dirty="0" smtClean="0"/>
+              <a:rPr lang="de-DE" dirty="0"/>
               <a:t>Click to add text</a:t>
             </a:r>
           </a:p>
@@ -1765,10 +1740,9 @@
           <a:p>
             <a:pPr lvl="0"/>
             <a:r>
-              <a:rPr lang="de-DE" dirty="0" smtClean="0"/>
+              <a:rPr lang="de-DE" dirty="0"/>
               <a:t>Tue</a:t>
             </a:r>
-            <a:endParaRPr lang="de-DE" dirty="0"/>
           </a:p>
         </p:txBody>
       </p:sp>
@@ -1812,7 +1786,7 @@
           <a:p>
             <a:pPr lvl="0"/>
             <a:r>
-              <a:rPr lang="de-DE" dirty="0" smtClean="0"/>
+              <a:rPr lang="de-DE" dirty="0"/>
               <a:t>Click to add text</a:t>
             </a:r>
           </a:p>
@@ -1828,13 +1802,6 @@
   <p:clrMapOvr>
     <a:masterClrMapping/>
   </p:clrMapOvr>
-  <p:timing>
-    <p:tnLst>
-      <p:par>
-        <p:cTn id="1" dur="indefinite" restart="never" nodeType="tmRoot"/>
-      </p:par>
-    </p:tnLst>
-  </p:timing>
 </p:sldLayout>
 </file>
 
@@ -1895,10 +1862,9 @@
           <a:p>
             <a:pPr lvl="0"/>
             <a:r>
-              <a:rPr lang="de-DE" dirty="0" smtClean="0"/>
+              <a:rPr lang="de-DE" dirty="0"/>
               <a:t>Tue</a:t>
             </a:r>
-            <a:endParaRPr lang="de-DE" dirty="0"/>
           </a:p>
         </p:txBody>
       </p:sp>
@@ -1951,10 +1917,9 @@
           <a:p>
             <a:pPr lvl="0"/>
             <a:r>
-              <a:rPr lang="de-DE" dirty="0" smtClean="0"/>
+              <a:rPr lang="de-DE" dirty="0"/>
               <a:t>Alternatives (use provided tabs)</a:t>
             </a:r>
-            <a:endParaRPr lang="de-DE" dirty="0"/>
           </a:p>
         </p:txBody>
       </p:sp>
@@ -2007,10 +1972,9 @@
           <a:p>
             <a:pPr lvl="0"/>
             <a:r>
-              <a:rPr lang="de-DE" dirty="0" smtClean="0"/>
+              <a:rPr lang="de-DE" dirty="0"/>
               <a:t>Alternatives (use provided tabs)</a:t>
             </a:r>
-            <a:endParaRPr lang="de-DE" dirty="0"/>
           </a:p>
         </p:txBody>
       </p:sp>
@@ -2054,7 +2018,7 @@
           <a:p>
             <a:pPr lvl="0"/>
             <a:r>
-              <a:rPr lang="de-DE" dirty="0" smtClean="0"/>
+              <a:rPr lang="de-DE" dirty="0"/>
               <a:t>Click to add text</a:t>
             </a:r>
           </a:p>
@@ -2100,10 +2064,9 @@
           <a:p>
             <a:pPr lvl="0"/>
             <a:r>
-              <a:rPr lang="de-DE" dirty="0" smtClean="0"/>
+              <a:rPr lang="de-DE" dirty="0"/>
               <a:t>Tue</a:t>
             </a:r>
-            <a:endParaRPr lang="de-DE" dirty="0"/>
           </a:p>
         </p:txBody>
       </p:sp>
@@ -2147,7 +2110,7 @@
           <a:p>
             <a:pPr lvl="0"/>
             <a:r>
-              <a:rPr lang="de-DE" dirty="0" smtClean="0"/>
+              <a:rPr lang="de-DE" dirty="0"/>
               <a:t>Click to add text</a:t>
             </a:r>
           </a:p>
@@ -2163,13 +2126,6 @@
   <p:clrMapOvr>
     <a:masterClrMapping/>
   </p:clrMapOvr>
-  <p:timing>
-    <p:tnLst>
-      <p:par>
-        <p:cTn id="1" dur="indefinite" restart="never" nodeType="tmRoot"/>
-      </p:par>
-    </p:tnLst>
-  </p:timing>
 </p:sldLayout>
 </file>
 
@@ -2230,10 +2186,9 @@
           <a:p>
             <a:pPr lvl="0"/>
             <a:r>
-              <a:rPr lang="de-DE" dirty="0" smtClean="0"/>
+              <a:rPr lang="de-DE" dirty="0"/>
               <a:t>Tue</a:t>
             </a:r>
-            <a:endParaRPr lang="de-DE" dirty="0"/>
           </a:p>
         </p:txBody>
       </p:sp>
@@ -2286,10 +2241,9 @@
           <a:p>
             <a:pPr lvl="0"/>
             <a:r>
-              <a:rPr lang="de-DE" dirty="0" smtClean="0"/>
+              <a:rPr lang="de-DE" dirty="0"/>
               <a:t>Alternatives (use provided tabs)</a:t>
             </a:r>
-            <a:endParaRPr lang="de-DE" dirty="0"/>
           </a:p>
         </p:txBody>
       </p:sp>
@@ -2342,10 +2296,9 @@
           <a:p>
             <a:pPr lvl="0"/>
             <a:r>
-              <a:rPr lang="de-DE" dirty="0" smtClean="0"/>
+              <a:rPr lang="de-DE" dirty="0"/>
               <a:t>Alternatives (use provided tabs)</a:t>
             </a:r>
-            <a:endParaRPr lang="de-DE" dirty="0"/>
           </a:p>
         </p:txBody>
       </p:sp>
@@ -2389,7 +2342,7 @@
           <a:p>
             <a:pPr lvl="0"/>
             <a:r>
-              <a:rPr lang="de-DE" dirty="0" smtClean="0"/>
+              <a:rPr lang="de-DE" dirty="0"/>
               <a:t>Click to add text</a:t>
             </a:r>
           </a:p>
@@ -2435,10 +2388,9 @@
           <a:p>
             <a:pPr lvl="0"/>
             <a:r>
-              <a:rPr lang="de-DE" dirty="0" smtClean="0"/>
+              <a:rPr lang="de-DE" dirty="0"/>
               <a:t>Tue</a:t>
             </a:r>
-            <a:endParaRPr lang="de-DE" dirty="0"/>
           </a:p>
         </p:txBody>
       </p:sp>
@@ -2479,7 +2431,7 @@
           <a:p>
             <a:pPr marL="0" lvl="0"/>
             <a:r>
-              <a:rPr lang="de-DE" dirty="0" smtClean="0"/>
+              <a:rPr lang="de-DE" dirty="0"/>
               <a:t>Click to add text</a:t>
             </a:r>
           </a:p>
@@ -2495,13 +2447,6 @@
   <p:clrMapOvr>
     <a:masterClrMapping/>
   </p:clrMapOvr>
-  <p:timing>
-    <p:tnLst>
-      <p:par>
-        <p:cTn id="1" dur="indefinite" restart="never" nodeType="tmRoot"/>
-      </p:par>
-    </p:tnLst>
-  </p:timing>
 </p:sldLayout>
 </file>
 
@@ -2546,7 +2491,7 @@
           <a:lstStyle/>
           <a:p>
             <a:r>
-              <a:rPr lang="en-US" smtClean="0"/>
+              <a:rPr lang="en-US"/>
               <a:t>Click to edit Master title style</a:t>
             </a:r>
             <a:endParaRPr lang="de-DE"/>
@@ -2578,35 +2523,35 @@
           <a:p>
             <a:pPr lvl="0"/>
             <a:r>
-              <a:rPr lang="en-US" smtClean="0"/>
+              <a:rPr lang="en-US"/>
               <a:t>Click to edit Master text styles</a:t>
             </a:r>
           </a:p>
           <a:p>
             <a:pPr lvl="1"/>
             <a:r>
-              <a:rPr lang="en-US" smtClean="0"/>
+              <a:rPr lang="en-US"/>
               <a:t>Second level</a:t>
             </a:r>
           </a:p>
           <a:p>
             <a:pPr lvl="2"/>
             <a:r>
-              <a:rPr lang="en-US" smtClean="0"/>
+              <a:rPr lang="en-US"/>
               <a:t>Third level</a:t>
             </a:r>
           </a:p>
           <a:p>
             <a:pPr lvl="3"/>
             <a:r>
-              <a:rPr lang="en-US" smtClean="0"/>
+              <a:rPr lang="en-US"/>
               <a:t>Fourth level</a:t>
             </a:r>
           </a:p>
           <a:p>
             <a:pPr lvl="4"/>
             <a:r>
-              <a:rPr lang="en-US" smtClean="0"/>
+              <a:rPr lang="en-US"/>
               <a:t>Fifth level</a:t>
             </a:r>
             <a:endParaRPr lang="de-DE"/>
@@ -2639,7 +2584,7 @@
             <a:fld id="{421FAFA7-FD27-4797-86F0-797A053F7FF1}" type="datetimeFigureOut">
               <a:rPr lang="de-DE" smtClean="0"/>
               <a:pPr/>
-              <a:t>17.04.2016</a:t>
+              <a:t>07.03.18</a:t>
             </a:fld>
             <a:endParaRPr lang="de-DE"/>
           </a:p>
@@ -2698,7 +2643,7 @@
             <a:fld id="{703B9BC4-30BC-4399-9BFE-1C5E7CA4881A}" type="slidenum">
               <a:rPr lang="de-DE" smtClean="0"/>
               <a:pPr/>
-              <a:t>‹#›</a:t>
+              <a:t>‹Nr.›</a:t>
             </a:fld>
             <a:endParaRPr lang="de-DE"/>
           </a:p>
@@ -2709,13 +2654,6 @@
   <p:clrMapOvr>
     <a:masterClrMapping/>
   </p:clrMapOvr>
-  <p:timing>
-    <p:tnLst>
-      <p:par>
-        <p:cTn id="1" dur="indefinite" restart="never" nodeType="tmRoot"/>
-      </p:par>
-    </p:tnLst>
-  </p:timing>
 </p:sldLayout>
 </file>
 
@@ -2741,13 +2679,6 @@
   <p:clrMapOvr>
     <a:masterClrMapping/>
   </p:clrMapOvr>
-  <p:timing>
-    <p:tnLst>
-      <p:par>
-        <p:cTn id="1" dur="indefinite" restart="never" nodeType="tmRoot"/>
-      </p:par>
-    </p:tnLst>
-  </p:timing>
 </p:sldLayout>
 </file>
 
@@ -2888,10 +2819,10 @@
                 <a:tabLst/>
                 <a:defRPr/>
               </a:pPr>
-              <a:t>‹#›</a:t>
+              <a:t>‹Nr.›</a:t>
             </a:fld>
             <a:r>
-              <a:rPr kumimoji="0" lang="de-DE" sz="1200" b="0" i="0" u="none" strike="noStrike" kern="1200" cap="none" spc="0" normalizeH="0" baseline="0" noProof="0" dirty="0" smtClean="0">
+              <a:rPr kumimoji="0" lang="de-DE" sz="1200" b="0" i="0" u="none" strike="noStrike" kern="1200" cap="none" spc="0" normalizeH="0" baseline="0" noProof="0" dirty="0">
                 <a:ln>
                   <a:noFill/>
                 </a:ln>
@@ -3054,10 +2985,10 @@
                 <a:tabLst/>
                 <a:defRPr/>
               </a:pPr>
-              <a:t>‹#›</a:t>
+              <a:t>‹Nr.›</a:t>
             </a:fld>
             <a:r>
-              <a:rPr kumimoji="0" lang="de-DE" sz="1200" b="0" i="0" u="none" strike="noStrike" kern="1200" cap="none" spc="0" normalizeH="0" baseline="0" noProof="0" dirty="0" smtClean="0">
+              <a:rPr kumimoji="0" lang="de-DE" sz="1200" b="0" i="0" u="none" strike="noStrike" kern="1200" cap="none" spc="0" normalizeH="0" baseline="0" noProof="0" dirty="0">
                 <a:ln>
                   <a:noFill/>
                 </a:ln>
@@ -3186,13 +3117,6 @@
     <p:sldLayoutId id="2147483650" r:id="rId6"/>
     <p:sldLayoutId id="2147483655" r:id="rId7"/>
   </p:sldLayoutIdLst>
-  <p:timing>
-    <p:tnLst>
-      <p:par>
-        <p:cTn id="1" dur="indefinite" restart="never" nodeType="tmRoot"/>
-      </p:par>
-    </p:tnLst>
-  </p:timing>
   <p:txStyles>
     <p:titleStyle>
       <a:lvl1pPr algn="ctr" defTabSz="914466" rtl="0" eaLnBrk="1" latinLnBrk="0" hangingPunct="1">
@@ -3498,10 +3422,9 @@
           <a:lstStyle/>
           <a:p>
             <a:r>
-              <a:rPr lang="de-DE" dirty="0" smtClean="0"/>
+              <a:rPr lang="de-DE" dirty="0"/>
               <a:t>Use  Buffer 0 in Sonic Pi</a:t>
             </a:r>
-            <a:endParaRPr lang="de-DE" dirty="0"/>
           </a:p>
         </p:txBody>
       </p:sp>
@@ -3521,10 +3444,9 @@
           <a:lstStyle/>
           <a:p>
             <a:r>
-              <a:rPr lang="de-DE" dirty="0" smtClean="0"/>
+              <a:rPr lang="de-DE" dirty="0"/>
               <a:t>Buffer 0</a:t>
             </a:r>
-            <a:endParaRPr lang="de-DE" dirty="0"/>
           </a:p>
         </p:txBody>
       </p:sp>
@@ -3571,7 +3493,7 @@
           <a:bodyPr rtlCol="0" anchor="ctr"/>
           <a:lstStyle/>
           <a:p>
-            <a:endParaRPr lang="en-US" dirty="0" smtClean="0">
+            <a:endParaRPr lang="en-US" dirty="0">
               <a:solidFill>
                 <a:schemeClr val="tx1"/>
               </a:solidFill>
@@ -3667,24 +3589,23 @@
           <a:p>
             <a:pPr algn="r"/>
             <a:r>
-              <a:rPr lang="de-DE" dirty="0" smtClean="0"/>
+              <a:rPr lang="de-DE" dirty="0"/>
               <a:t>A Sonic Pi Workshop</a:t>
             </a:r>
           </a:p>
           <a:p>
             <a:pPr algn="r"/>
             <a:r>
-              <a:rPr lang="de-DE" dirty="0" smtClean="0"/>
+              <a:rPr lang="de-DE" dirty="0"/>
               <a:t>For Kids</a:t>
             </a:r>
           </a:p>
           <a:p>
             <a:pPr algn="r"/>
             <a:r>
-              <a:rPr lang="de-DE" sz="1100" dirty="0" smtClean="0"/>
+              <a:rPr lang="de-DE" sz="1100" dirty="0"/>
               <a:t>by Stefan Höhn, Irene Höppner und Matthias Malstädt</a:t>
             </a:r>
-            <a:endParaRPr lang="de-DE" sz="1100" dirty="0"/>
           </a:p>
         </p:txBody>
       </p:sp>
@@ -3698,13 +3619,6 @@
   <p:clrMapOvr>
     <a:masterClrMapping/>
   </p:clrMapOvr>
-  <p:timing>
-    <p:tnLst>
-      <p:par>
-        <p:cTn id="1" dur="indefinite" restart="never" nodeType="tmRoot"/>
-      </p:par>
-    </p:tnLst>
-  </p:timing>
 </p:sld>
 </file>
 
@@ -3741,10 +3655,9 @@
           <a:lstStyle/>
           <a:p>
             <a:r>
-              <a:rPr lang="de-DE" dirty="0" smtClean="0"/>
+              <a:rPr lang="de-DE" dirty="0"/>
               <a:t>Use Buffer 4</a:t>
             </a:r>
-            <a:endParaRPr lang="de-DE" dirty="0"/>
           </a:p>
         </p:txBody>
       </p:sp>
@@ -3802,10 +3715,9 @@
           <a:lstStyle/>
           <a:p>
             <a:r>
-              <a:rPr lang="de-DE" dirty="0" smtClean="0"/>
+              <a:rPr lang="de-DE" dirty="0"/>
               <a:t>BUFFER 4</a:t>
             </a:r>
-            <a:endParaRPr lang="de-DE" dirty="0"/>
           </a:p>
         </p:txBody>
       </p:sp>
@@ -3857,13 +3769,6 @@
   <p:clrMapOvr>
     <a:masterClrMapping/>
   </p:clrMapOvr>
-  <p:timing>
-    <p:tnLst>
-      <p:par>
-        <p:cTn id="1" dur="indefinite" restart="never" nodeType="tmRoot"/>
-      </p:par>
-    </p:tnLst>
-  </p:timing>
 </p:sld>
 </file>
 
@@ -3900,10 +3805,9 @@
           <a:lstStyle/>
           <a:p>
             <a:r>
-              <a:rPr lang="de-DE" dirty="0" smtClean="0"/>
+              <a:rPr lang="de-DE" dirty="0"/>
               <a:t>An endless loop that can be changed during playing</a:t>
             </a:r>
-            <a:endParaRPr lang="de-DE" dirty="0"/>
           </a:p>
         </p:txBody>
       </p:sp>
@@ -3928,31 +3832,31 @@
           <a:lstStyle/>
           <a:p>
             <a:r>
-              <a:rPr lang="de-DE" dirty="0" smtClean="0"/>
+              <a:rPr lang="de-DE" dirty="0"/>
               <a:t>Add another sample </a:t>
             </a:r>
             <a:r>
-              <a:rPr lang="de-DE" i="1" dirty="0" smtClean="0"/>
+              <a:rPr lang="de-DE" i="1" dirty="0"/>
               <a:t>sn_zome</a:t>
             </a:r>
             <a:r>
-              <a:rPr lang="de-DE" dirty="0" smtClean="0"/>
+              <a:rPr lang="de-DE" dirty="0"/>
               <a:t> with </a:t>
             </a:r>
             <a:r>
-              <a:rPr lang="de-DE" i="1" dirty="0" smtClean="0"/>
+              <a:rPr lang="de-DE" i="1" dirty="0"/>
               <a:t>sleep 1</a:t>
             </a:r>
           </a:p>
           <a:p>
             <a:r>
-              <a:rPr lang="de-DE" dirty="0" smtClean="0"/>
+              <a:rPr lang="de-DE" dirty="0"/>
               <a:t>Make the drums faster (120)</a:t>
             </a:r>
           </a:p>
           <a:p>
             <a:r>
-              <a:rPr lang="de-DE" dirty="0" smtClean="0"/>
+              <a:rPr lang="de-DE" dirty="0"/>
               <a:t>:drum_bass_hard	:drum_snare_hard	:drum_tom_hi_hard</a:t>
             </a:r>
           </a:p>
@@ -3993,28 +3897,27 @@
           <a:lstStyle/>
           <a:p>
             <a:r>
-              <a:rPr lang="de-DE" dirty="0" smtClean="0"/>
+              <a:rPr lang="de-DE" dirty="0"/>
               <a:t>live_loop :schlagzeug do  	</a:t>
             </a:r>
           </a:p>
           <a:p>
             <a:r>
-              <a:rPr lang="de-DE" dirty="0" smtClean="0"/>
+              <a:rPr lang="de-DE" dirty="0"/>
               <a:t>	sample :bd_haus</a:t>
             </a:r>
           </a:p>
           <a:p>
             <a:r>
-              <a:rPr lang="de-DE" dirty="0" smtClean="0"/>
+              <a:rPr lang="de-DE" dirty="0"/>
               <a:t> 	sleep 1</a:t>
             </a:r>
           </a:p>
           <a:p>
             <a:r>
-              <a:rPr lang="de-DE" dirty="0" smtClean="0"/>
+              <a:rPr lang="de-DE" dirty="0"/>
               <a:t>end</a:t>
             </a:r>
-            <a:endParaRPr lang="de-DE" dirty="0"/>
           </a:p>
         </p:txBody>
       </p:sp>
@@ -4066,13 +3969,6 @@
   <p:clrMapOvr>
     <a:masterClrMapping/>
   </p:clrMapOvr>
-  <p:timing>
-    <p:tnLst>
-      <p:par>
-        <p:cTn id="1" dur="indefinite" restart="never" nodeType="tmRoot"/>
-      </p:par>
-    </p:tnLst>
-  </p:timing>
 </p:sld>
 </file>
 
@@ -4109,10 +4005,9 @@
           <a:lstStyle/>
           <a:p>
             <a:r>
-              <a:rPr lang="de-DE" dirty="0" smtClean="0"/>
+              <a:rPr lang="de-DE" dirty="0"/>
               <a:t>Use Buffer 5</a:t>
             </a:r>
-            <a:endParaRPr lang="de-DE" dirty="0"/>
           </a:p>
         </p:txBody>
       </p:sp>
@@ -4170,10 +4065,9 @@
           <a:lstStyle/>
           <a:p>
             <a:r>
-              <a:rPr lang="de-DE" dirty="0" smtClean="0"/>
+              <a:rPr lang="de-DE" dirty="0"/>
               <a:t>BUFFER 5</a:t>
             </a:r>
-            <a:endParaRPr lang="de-DE" dirty="0"/>
           </a:p>
         </p:txBody>
       </p:sp>
@@ -4225,13 +4119,6 @@
   <p:clrMapOvr>
     <a:masterClrMapping/>
   </p:clrMapOvr>
-  <p:timing>
-    <p:tnLst>
-      <p:par>
-        <p:cTn id="1" dur="indefinite" restart="never" nodeType="tmRoot"/>
-      </p:par>
-    </p:tnLst>
-  </p:timing>
 </p:sld>
 </file>
 
@@ -4268,10 +4155,9 @@
           <a:lstStyle/>
           <a:p>
             <a:r>
-              <a:rPr lang="de-DE" dirty="0" smtClean="0"/>
+              <a:rPr lang="de-DE" dirty="0"/>
               <a:t>An electric guitar sample</a:t>
             </a:r>
-            <a:endParaRPr lang="de-DE" dirty="0"/>
           </a:p>
         </p:txBody>
       </p:sp>
@@ -4296,7 +4182,7 @@
           <a:lstStyle/>
           <a:p>
             <a:r>
-              <a:rPr lang="de-DE" dirty="0" smtClean="0"/>
+              <a:rPr lang="de-DE" dirty="0"/>
               <a:t>Tryout and then copy the drums (buffer 4) and the melody together in to buffer 5</a:t>
             </a:r>
           </a:p>
@@ -4323,28 +4209,27 @@
           <a:lstStyle/>
           <a:p>
             <a:r>
-              <a:rPr lang="de-DE" dirty="0" smtClean="0"/>
+              <a:rPr lang="de-DE" dirty="0"/>
               <a:t>use_bpm		use_synth :hollow		,amp: 5</a:t>
             </a:r>
           </a:p>
           <a:p>
             <a:r>
-              <a:rPr lang="de-DE" dirty="0" err="1" smtClean="0"/>
+              <a:rPr lang="de-DE" dirty="0" err="1"/>
               <a:t>use_synth</a:t>
             </a:r>
             <a:r>
-              <a:rPr lang="de-DE" dirty="0" smtClean="0"/>
+              <a:rPr lang="de-DE" dirty="0"/>
               <a:t>: </a:t>
             </a:r>
             <a:r>
-              <a:rPr lang="de-DE" dirty="0" err="1" smtClean="0"/>
+              <a:rPr lang="de-DE" dirty="0" err="1"/>
               <a:t>hoover</a:t>
             </a:r>
             <a:r>
-              <a:rPr lang="de-DE" dirty="0" smtClean="0"/>
+              <a:rPr lang="de-DE" dirty="0"/>
               <a:t>		</a:t>
             </a:r>
-            <a:endParaRPr lang="de-DE" dirty="0"/>
           </a:p>
         </p:txBody>
       </p:sp>
@@ -4370,19 +4255,19 @@
           <a:p>
             <a:pPr algn="l"/>
             <a:r>
-              <a:rPr lang="de-DE" dirty="0" err="1" smtClean="0"/>
+              <a:rPr lang="de-DE" dirty="0" err="1"/>
               <a:t>live_loop</a:t>
             </a:r>
             <a:r>
-              <a:rPr lang="de-DE" dirty="0" smtClean="0"/>
+              <a:rPr lang="de-DE" dirty="0"/>
               <a:t> :</a:t>
             </a:r>
             <a:r>
-              <a:rPr lang="de-DE" dirty="0" err="1" smtClean="0"/>
+              <a:rPr lang="de-DE" dirty="0" err="1"/>
               <a:t>melodie</a:t>
             </a:r>
             <a:r>
-              <a:rPr lang="de-DE" dirty="0" smtClean="0"/>
+              <a:rPr lang="de-DE" dirty="0"/>
               <a:t> do  	</a:t>
             </a:r>
           </a:p>
@@ -4390,32 +4275,28 @@
             <a:pPr algn="l"/>
             <a:r>
               <a:rPr lang="de-DE" dirty="0"/>
-              <a:t>	</a:t>
-            </a:r>
-            <a:r>
-              <a:rPr lang="de-DE" dirty="0" smtClean="0"/>
-              <a:t>sample :guit_em9</a:t>
+              <a:t>	sample :guit_em9</a:t>
             </a:r>
           </a:p>
           <a:p>
             <a:pPr algn="l"/>
             <a:r>
-              <a:rPr lang="de-DE" dirty="0" smtClean="0"/>
+              <a:rPr lang="de-DE" dirty="0"/>
               <a:t> 	</a:t>
             </a:r>
             <a:r>
-              <a:rPr lang="de-DE" dirty="0" err="1" smtClean="0"/>
+              <a:rPr lang="de-DE" dirty="0" err="1"/>
               <a:t>sleep</a:t>
             </a:r>
             <a:r>
-              <a:rPr lang="de-DE" dirty="0" smtClean="0"/>
+              <a:rPr lang="de-DE" dirty="0"/>
               <a:t> 2</a:t>
             </a:r>
           </a:p>
           <a:p>
             <a:pPr algn="l"/>
             <a:r>
-              <a:rPr lang="de-DE" dirty="0" smtClean="0"/>
+              <a:rPr lang="de-DE" dirty="0"/>
               <a:t>end</a:t>
             </a:r>
           </a:p>
@@ -4442,10 +4323,9 @@
           <a:lstStyle/>
           <a:p>
             <a:r>
-              <a:rPr lang="de-DE" dirty="0" smtClean="0"/>
+              <a:rPr lang="de-DE" dirty="0"/>
               <a:t>Use Size- and Size +. To change the size of the text</a:t>
             </a:r>
-            <a:endParaRPr lang="de-DE" dirty="0"/>
           </a:p>
         </p:txBody>
       </p:sp>
@@ -4474,7 +4354,7 @@
               <a:buChar char="-"/>
             </a:pPr>
             <a:r>
-              <a:rPr lang="de-DE" sz="2000" dirty="0" smtClean="0"/>
+              <a:rPr lang="de-DE" sz="2000" dirty="0"/>
               <a:t>Now put everything together in buffer 6</a:t>
             </a:r>
           </a:p>
@@ -4484,7 +4364,7 @@
               <a:buChar char="-"/>
             </a:pPr>
             <a:r>
-              <a:rPr lang="de-DE" sz="2000" dirty="0" smtClean="0"/>
+              <a:rPr lang="de-DE" sz="2000" dirty="0"/>
               <a:t>First Buffer 5, then buffer 3 and then 2</a:t>
             </a:r>
           </a:p>
@@ -4494,7 +4374,7 @@
               <a:buChar char="-"/>
             </a:pPr>
             <a:r>
-              <a:rPr lang="de-DE" sz="2000" dirty="0" smtClean="0"/>
+              <a:rPr lang="de-DE" sz="2000" dirty="0"/>
               <a:t>Run again after each copying and listen</a:t>
             </a:r>
           </a:p>
@@ -4504,7 +4384,7 @@
               <a:buChar char="-"/>
             </a:pPr>
             <a:r>
-              <a:rPr lang="de-DE" sz="2000" dirty="0" smtClean="0"/>
+              <a:rPr lang="de-DE" sz="2000" dirty="0"/>
               <a:t>The copy buffer 1 and add a live_loop. </a:t>
             </a:r>
           </a:p>
@@ -4514,7 +4394,7 @@
               <a:buChar char="-"/>
             </a:pPr>
             <a:r>
-              <a:rPr lang="de-DE" sz="2000" dirty="0" smtClean="0"/>
+              <a:rPr lang="de-DE" sz="2000" dirty="0"/>
               <a:t>Something isn‘t quite right yet. What is it?</a:t>
             </a:r>
           </a:p>
@@ -4530,13 +4410,6 @@
   <p:clrMapOvr>
     <a:masterClrMapping/>
   </p:clrMapOvr>
-  <p:timing>
-    <p:tnLst>
-      <p:par>
-        <p:cTn id="1" dur="indefinite" restart="never" nodeType="tmRoot"/>
-      </p:par>
-    </p:tnLst>
-  </p:timing>
 </p:sld>
 </file>
 
@@ -4578,14 +4451,9 @@
           <a:lstStyle/>
           <a:p>
             <a:r>
-              <a:rPr lang="en-US" dirty="0" smtClean="0"/>
-              <a:t>Experiment with you</a:t>
-            </a:r>
-            <a:r>
-              <a:rPr lang="en-US" dirty="0" smtClean="0"/>
-              <a:t>r mentor</a:t>
-            </a:r>
-            <a:endParaRPr lang="en-US" dirty="0" smtClean="0"/>
+              <a:rPr lang="en-US" dirty="0"/>
+              <a:t>Experiment with your mentor</a:t>
+            </a:r>
           </a:p>
           <a:p>
             <a:endParaRPr lang="en-US" dirty="0"/>
@@ -4632,18 +4500,17 @@
           <a:lstStyle/>
           <a:p>
             <a:r>
-              <a:rPr lang="en-US" dirty="0" smtClean="0"/>
+              <a:rPr lang="en-US" dirty="0"/>
               <a:t>Add around a </a:t>
             </a:r>
             <a:r>
-              <a:rPr lang="en-US" dirty="0" err="1" smtClean="0"/>
+              <a:rPr lang="en-US" dirty="0" err="1"/>
               <a:t>live_loop</a:t>
             </a:r>
             <a:r>
-              <a:rPr lang="en-US" dirty="0" smtClean="0"/>
+              <a:rPr lang="en-US" dirty="0"/>
               <a:t> and listen. What happens here?</a:t>
             </a:r>
-            <a:endParaRPr lang="en-US" dirty="0" smtClean="0"/>
           </a:p>
         </p:txBody>
       </p:sp>
@@ -4669,7 +4536,7 @@
           <a:p>
             <a:pPr algn="l"/>
             <a:r>
-              <a:rPr lang="en-US" sz="2400" dirty="0" smtClean="0"/>
+              <a:rPr lang="en-US" sz="2400" dirty="0"/>
               <a:t>More ideas</a:t>
             </a:r>
           </a:p>
@@ -4679,7 +4546,7 @@
               <a:buChar char="-"/>
             </a:pPr>
             <a:r>
-              <a:rPr lang="en-US" sz="2400" dirty="0" smtClean="0"/>
+              <a:rPr lang="en-US" sz="2400" dirty="0"/>
               <a:t>Work on the drums</a:t>
             </a:r>
           </a:p>
@@ -4689,7 +4556,7 @@
               <a:buChar char="-"/>
             </a:pPr>
             <a:r>
-              <a:rPr lang="en-US" sz="2400" dirty="0" smtClean="0"/>
+              <a:rPr lang="en-US" sz="2400" dirty="0"/>
               <a:t>Play around with melodies</a:t>
             </a:r>
           </a:p>
@@ -4699,7 +4566,7 @@
               <a:buChar char="-"/>
             </a:pPr>
             <a:r>
-              <a:rPr lang="en-US" sz="2400" dirty="0" smtClean="0"/>
+              <a:rPr lang="en-US" sz="2400" dirty="0"/>
               <a:t>Effects</a:t>
             </a:r>
           </a:p>
@@ -4709,7 +4576,7 @@
               <a:buChar char="-"/>
             </a:pPr>
             <a:r>
-              <a:rPr lang="en-US" sz="2400" dirty="0" smtClean="0"/>
+              <a:rPr lang="en-US" sz="2400" dirty="0"/>
               <a:t>What about variables and conditions?</a:t>
             </a:r>
           </a:p>
@@ -4719,18 +4586,17 @@
               <a:buChar char="-"/>
             </a:pPr>
             <a:r>
-              <a:rPr lang="en-US" sz="2400" dirty="0" smtClean="0"/>
+              <a:rPr lang="en-US" sz="2400" dirty="0"/>
               <a:t>Samples „loop_“ with </a:t>
             </a:r>
             <a:r>
-              <a:rPr lang="en-US" sz="2400" dirty="0" err="1" smtClean="0"/>
+              <a:rPr lang="en-US" sz="2400" dirty="0" err="1"/>
               <a:t>sample_duration</a:t>
             </a:r>
             <a:r>
-              <a:rPr lang="en-US" sz="2400" dirty="0" smtClean="0"/>
+              <a:rPr lang="en-US" sz="2400" dirty="0"/>
               <a:t>()</a:t>
             </a:r>
-            <a:endParaRPr lang="en-US" sz="2400" dirty="0"/>
           </a:p>
         </p:txBody>
       </p:sp>
@@ -4750,10 +4616,9 @@
           <a:lstStyle/>
           <a:p>
             <a:r>
-              <a:rPr lang="en-US" dirty="0" smtClean="0"/>
+              <a:rPr lang="en-US" dirty="0"/>
               <a:t>Variables and conditions</a:t>
             </a:r>
-            <a:endParaRPr lang="en-US" dirty="0"/>
           </a:p>
         </p:txBody>
       </p:sp>
@@ -4779,52 +4644,51 @@
           <a:p>
             <a:pPr algn="l"/>
             <a:r>
-              <a:rPr lang="en-US" sz="2000" dirty="0" smtClean="0"/>
+              <a:rPr lang="en-US" sz="2000" dirty="0"/>
               <a:t>a = 30</a:t>
             </a:r>
           </a:p>
           <a:p>
             <a:pPr algn="l"/>
             <a:r>
-              <a:rPr lang="en-US" sz="2000" dirty="0" smtClean="0"/>
+              <a:rPr lang="en-US" sz="2000" dirty="0"/>
               <a:t>if a &lt; 100</a:t>
             </a:r>
           </a:p>
           <a:p>
             <a:pPr algn="l"/>
             <a:r>
-              <a:rPr lang="en-US" sz="2000" dirty="0" smtClean="0"/>
+              <a:rPr lang="en-US" sz="2000" dirty="0"/>
               <a:t>   a = a +1</a:t>
             </a:r>
           </a:p>
           <a:p>
             <a:pPr algn="l"/>
             <a:r>
-              <a:rPr lang="en-US" sz="2000" dirty="0" smtClean="0"/>
+              <a:rPr lang="en-US" sz="2000" dirty="0"/>
               <a:t>   play a</a:t>
             </a:r>
           </a:p>
           <a:p>
             <a:pPr algn="l"/>
             <a:r>
-              <a:rPr lang="en-US" sz="2000" dirty="0" smtClean="0"/>
+              <a:rPr lang="en-US" sz="2000" dirty="0"/>
               <a:t>else</a:t>
             </a:r>
           </a:p>
           <a:p>
             <a:pPr algn="l"/>
             <a:r>
-              <a:rPr lang="en-US" sz="2000" dirty="0" smtClean="0"/>
+              <a:rPr lang="en-US" sz="2000" dirty="0"/>
               <a:t>   a = 30</a:t>
             </a:r>
           </a:p>
           <a:p>
             <a:pPr algn="l"/>
             <a:r>
-              <a:rPr lang="en-US" sz="2000" dirty="0" smtClean="0"/>
+              <a:rPr lang="en-US" sz="2000" dirty="0"/>
               <a:t>end  </a:t>
             </a:r>
-            <a:endParaRPr lang="en-US" sz="2000" dirty="0" smtClean="0"/>
           </a:p>
         </p:txBody>
       </p:sp>
@@ -4838,13 +4702,6 @@
   <p:clrMapOvr>
     <a:masterClrMapping/>
   </p:clrMapOvr>
-  <p:timing>
-    <p:tnLst>
-      <p:par>
-        <p:cTn id="1" dur="indefinite" restart="never" nodeType="tmRoot"/>
-      </p:par>
-    </p:tnLst>
-  </p:timing>
 </p:sld>
 </file>
 
@@ -4881,10 +4738,9 @@
           <a:lstStyle/>
           <a:p>
             <a:r>
-              <a:rPr lang="de-DE" dirty="0" smtClean="0"/>
+              <a:rPr lang="de-DE" dirty="0"/>
               <a:t>That‘s how you can apply effects</a:t>
             </a:r>
-            <a:endParaRPr lang="de-DE" dirty="0"/>
           </a:p>
         </p:txBody>
       </p:sp>
@@ -4913,7 +4769,7 @@
               <a:buChar char="-"/>
             </a:pPr>
             <a:r>
-              <a:rPr lang="de-DE" dirty="0" smtClean="0"/>
+              <a:rPr lang="de-DE" dirty="0"/>
               <a:t>fx stands for „effects“. Each effect has its parameters: here the size of the room of the reverb.</a:t>
             </a:r>
           </a:p>
@@ -4923,7 +4779,7 @@
               <a:buChar char="-"/>
             </a:pPr>
             <a:r>
-              <a:rPr lang="de-DE" dirty="0" smtClean="0"/>
+              <a:rPr lang="de-DE" dirty="0"/>
               <a:t>Try other effects (see fx in help section)</a:t>
             </a:r>
           </a:p>
@@ -4933,10 +4789,9 @@
               <a:buChar char="-"/>
             </a:pPr>
             <a:r>
-              <a:rPr lang="de-DE" dirty="0" smtClean="0"/>
+              <a:rPr lang="de-DE" dirty="0"/>
               <a:t>Use play and choose and a speed of 300</a:t>
             </a:r>
-            <a:endParaRPr lang="de-DE" dirty="0"/>
           </a:p>
         </p:txBody>
       </p:sp>
@@ -4967,21 +4822,16 @@
             </a:r>
             <a:r>
               <a:rPr lang="en-US" sz="2400" dirty="0"/>
-              <a:t> </a:t>
-            </a:r>
-            <a:r>
-              <a:rPr lang="en-US" sz="2400" dirty="0" smtClean="0"/>
-              <a:t>:</a:t>
-            </a:r>
-            <a:r>
-              <a:rPr lang="en-US" sz="2400" dirty="0" err="1" smtClean="0"/>
+              <a:t> :</a:t>
+            </a:r>
+            <a:r>
+              <a:rPr lang="en-US" sz="2400" dirty="0" err="1"/>
               <a:t>withReverv</a:t>
             </a:r>
             <a:r>
-              <a:rPr lang="en-US" sz="2400" dirty="0" smtClean="0"/>
+              <a:rPr lang="en-US" sz="2400" dirty="0"/>
               <a:t> do</a:t>
             </a:r>
-            <a:endParaRPr lang="en-US" sz="2400" dirty="0"/>
           </a:p>
           <a:p>
             <a:pPr algn="l"/>
@@ -5026,7 +4876,7 @@
               <a:rPr lang="en-US" sz="2400" dirty="0"/>
               <a:t>end</a:t>
             </a:r>
-            <a:endParaRPr lang="de-DE" sz="2400" dirty="0" smtClean="0"/>
+            <a:endParaRPr lang="de-DE" sz="2400" dirty="0"/>
           </a:p>
         </p:txBody>
       </p:sp>
@@ -5102,13 +4952,6 @@
   <p:clrMapOvr>
     <a:masterClrMapping/>
   </p:clrMapOvr>
-  <p:timing>
-    <p:tnLst>
-      <p:par>
-        <p:cTn id="1" dur="indefinite" restart="never" nodeType="tmRoot"/>
-      </p:par>
-    </p:tnLst>
-  </p:timing>
 </p:sld>
 </file>
 
@@ -5131,13 +4974,19 @@
       </p:grpSpPr>
       <p:sp>
         <p:nvSpPr>
-          <p:cNvPr id="8" name="Rectangle 7"/>
+          <p:cNvPr id="18" name="Rectangle 7">
+            <a:extLst>
+              <a:ext uri="{FF2B5EF4-FFF2-40B4-BE49-F238E27FC236}">
+                <a16:creationId xmlns:a16="http://schemas.microsoft.com/office/drawing/2014/main" id="{3269968B-BF18-4343-9548-9A95C4ADFB9E}"/>
+              </a:ext>
+            </a:extLst>
+          </p:cNvPr>
           <p:cNvSpPr/>
           <p:nvPr/>
         </p:nvSpPr>
         <p:spPr>
           <a:xfrm>
-            <a:off x="-16260" y="585864"/>
+            <a:off x="27384" y="585864"/>
             <a:ext cx="6858000" cy="8532440"/>
           </a:xfrm>
           <a:prstGeom prst="rect">
@@ -5172,7 +5021,7 @@
           <a:bodyPr rtlCol="0" anchor="ctr"/>
           <a:lstStyle/>
           <a:p>
-            <a:endParaRPr lang="en-US" dirty="0" smtClean="0">
+            <a:endParaRPr lang="en-US">
               <a:solidFill>
                 <a:schemeClr val="tx1"/>
               </a:solidFill>
@@ -5182,7 +5031,13 @@
       </p:sp>
       <p:sp>
         <p:nvSpPr>
-          <p:cNvPr id="9" name="TextBox 8"/>
+          <p:cNvPr id="19" name="TextBox 8">
+            <a:extLst>
+              <a:ext uri="{FF2B5EF4-FFF2-40B4-BE49-F238E27FC236}">
+                <a16:creationId xmlns:a16="http://schemas.microsoft.com/office/drawing/2014/main" id="{6C2F4A59-8ADA-BD4F-AED8-5F61C6DB3D0B}"/>
+              </a:ext>
+            </a:extLst>
+          </p:cNvPr>
           <p:cNvSpPr txBox="1"/>
           <p:nvPr/>
         </p:nvSpPr>
@@ -5203,12 +5058,20 @@
           <a:lstStyle/>
           <a:p>
             <a:r>
-              <a:rPr lang="de-DE" sz="3200" dirty="0" smtClean="0">
+              <a:rPr lang="de-DE" sz="3200" dirty="0">
                 <a:solidFill>
                   <a:schemeClr val="accent6"/>
                 </a:solidFill>
               </a:rPr>
-              <a:t>Cheat sheet</a:t>
+              <a:t>Cheat </a:t>
+            </a:r>
+            <a:r>
+              <a:rPr lang="de-DE" sz="3200" dirty="0" err="1">
+                <a:solidFill>
+                  <a:schemeClr val="accent6"/>
+                </a:solidFill>
+              </a:rPr>
+              <a:t>sheet</a:t>
             </a:r>
             <a:endParaRPr lang="de-DE" sz="3200" dirty="0">
               <a:solidFill>
@@ -5220,14 +5083,20 @@
       </p:sp>
       <p:sp>
         <p:nvSpPr>
-          <p:cNvPr id="4" name="Rectangle 3"/>
+          <p:cNvPr id="20" name="Rectangle 3">
+            <a:extLst>
+              <a:ext uri="{FF2B5EF4-FFF2-40B4-BE49-F238E27FC236}">
+                <a16:creationId xmlns:a16="http://schemas.microsoft.com/office/drawing/2014/main" id="{79E0AEDA-9985-624C-ABB6-FC81033A1813}"/>
+              </a:ext>
+            </a:extLst>
+          </p:cNvPr>
           <p:cNvSpPr/>
           <p:nvPr/>
         </p:nvSpPr>
         <p:spPr>
           <a:xfrm>
-            <a:off x="476672" y="1835696"/>
-            <a:ext cx="3933109" cy="369332"/>
+            <a:off x="322853" y="1496925"/>
+            <a:ext cx="936104" cy="369332"/>
           </a:xfrm>
           <a:prstGeom prst="rect">
             <a:avLst/>
@@ -5254,32 +5123,31 @@
           <a:lstStyle/>
           <a:p>
             <a:r>
-              <a:rPr lang="de-DE" dirty="0"/>
-              <a:t>play :c4  </a:t>
-            </a:r>
-            <a:r>
-              <a:rPr lang="de-DE" dirty="0" smtClean="0">
-                <a:sym typeface="Wingdings" pitchFamily="2" charset="2"/>
-              </a:rPr>
-              <a:t>   a scale = </a:t>
-            </a:r>
-            <a:r>
-              <a:rPr lang="de-DE" dirty="0" smtClean="0"/>
-              <a:t>c,d,e,f,g,a,b,c</a:t>
-            </a:r>
-            <a:endParaRPr lang="de-DE" dirty="0"/>
-          </a:p>
-        </p:txBody>
-      </p:sp>
-      <p:sp>
-        <p:nvSpPr>
-          <p:cNvPr id="5" name="Rectangle 4"/>
+              <a:rPr lang="de-DE" dirty="0" err="1"/>
+              <a:t>play</a:t>
+            </a:r>
+            <a:r>
+              <a:rPr lang="de-DE" dirty="0"/>
+              <a:t> :c4</a:t>
+            </a:r>
+          </a:p>
+        </p:txBody>
+      </p:sp>
+      <p:sp>
+        <p:nvSpPr>
+          <p:cNvPr id="21" name="Rectangle 4">
+            <a:extLst>
+              <a:ext uri="{FF2B5EF4-FFF2-40B4-BE49-F238E27FC236}">
+                <a16:creationId xmlns:a16="http://schemas.microsoft.com/office/drawing/2014/main" id="{F516D2B5-45F4-7548-B1CB-0E12F0B3BF45}"/>
+              </a:ext>
+            </a:extLst>
+          </p:cNvPr>
           <p:cNvSpPr/>
           <p:nvPr/>
         </p:nvSpPr>
         <p:spPr>
           <a:xfrm>
-            <a:off x="4221088" y="1259632"/>
+            <a:off x="1753027" y="1180739"/>
             <a:ext cx="849913" cy="369332"/>
           </a:xfrm>
           <a:prstGeom prst="rect">
@@ -5307,25 +5175,39 @@
           <a:lstStyle/>
           <a:p>
             <a:r>
+              <a:rPr lang="de-DE" dirty="0" err="1">
+                <a:solidFill>
+                  <a:schemeClr val="dk1"/>
+                </a:solidFill>
+              </a:rPr>
+              <a:t>sleep</a:t>
+            </a:r>
+            <a:r>
               <a:rPr lang="de-DE" dirty="0">
                 <a:solidFill>
                   <a:schemeClr val="dk1"/>
                 </a:solidFill>
               </a:rPr>
-              <a:t>sleep 1</a:t>
-            </a:r>
-          </a:p>
-        </p:txBody>
-      </p:sp>
-      <p:sp>
-        <p:nvSpPr>
-          <p:cNvPr id="6" name="Rectangle 5"/>
+              <a:t> 1</a:t>
+            </a:r>
+          </a:p>
+        </p:txBody>
+      </p:sp>
+      <p:sp>
+        <p:nvSpPr>
+          <p:cNvPr id="22" name="Rectangle 5">
+            <a:extLst>
+              <a:ext uri="{FF2B5EF4-FFF2-40B4-BE49-F238E27FC236}">
+                <a16:creationId xmlns:a16="http://schemas.microsoft.com/office/drawing/2014/main" id="{44ADDE7F-A8A1-DE45-A222-65C43F4372F8}"/>
+              </a:ext>
+            </a:extLst>
+          </p:cNvPr>
           <p:cNvSpPr/>
           <p:nvPr/>
         </p:nvSpPr>
         <p:spPr>
           <a:xfrm>
-            <a:off x="3140968" y="2555776"/>
+            <a:off x="3349355" y="1974357"/>
             <a:ext cx="2501582" cy="369332"/>
           </a:xfrm>
           <a:prstGeom prst="rect">
@@ -5353,26 +5235,40 @@
           <a:lstStyle/>
           <a:p>
             <a:r>
+              <a:rPr lang="de-DE" dirty="0" err="1">
+                <a:solidFill>
+                  <a:schemeClr val="dk1"/>
+                </a:solidFill>
+              </a:rPr>
+              <a:t>play_chord</a:t>
+            </a:r>
+            <a:r>
               <a:rPr lang="de-DE" dirty="0">
                 <a:solidFill>
                   <a:schemeClr val="dk1"/>
                 </a:solidFill>
               </a:rPr>
-              <a:t>play_chord [:c4, :e4, :g4]</a:t>
-            </a:r>
-          </a:p>
-        </p:txBody>
-      </p:sp>
-      <p:sp>
-        <p:nvSpPr>
-          <p:cNvPr id="7" name="Rectangle 6"/>
+              <a:t> [:c4, :e4, :g4]</a:t>
+            </a:r>
+          </a:p>
+        </p:txBody>
+      </p:sp>
+      <p:sp>
+        <p:nvSpPr>
+          <p:cNvPr id="23" name="Rectangle 6">
+            <a:extLst>
+              <a:ext uri="{FF2B5EF4-FFF2-40B4-BE49-F238E27FC236}">
+                <a16:creationId xmlns:a16="http://schemas.microsoft.com/office/drawing/2014/main" id="{17DF23D8-7FD7-F94B-89C2-1337475CEB4D}"/>
+              </a:ext>
+            </a:extLst>
+          </p:cNvPr>
           <p:cNvSpPr/>
           <p:nvPr/>
         </p:nvSpPr>
         <p:spPr>
           <a:xfrm>
-            <a:off x="980728" y="3275856"/>
-            <a:ext cx="4942763" cy="369332"/>
+            <a:off x="736985" y="2655230"/>
+            <a:ext cx="5472608" cy="646331"/>
           </a:xfrm>
           <a:prstGeom prst="rect">
             <a:avLst/>
@@ -5412,34 +5308,61 @@
                   <a:schemeClr val="dk1"/>
                 </a:solidFill>
               </a:rPr>
-              <a:t> chord(:e4, :major)     </a:t>
-            </a:r>
-            <a:r>
+              <a:t> chord(:e4, :major) </a:t>
+            </a:r>
+            <a:br>
               <a:rPr lang="en-US" dirty="0">
                 <a:solidFill>
                   <a:schemeClr val="dk1"/>
                 </a:solidFill>
-                <a:sym typeface="Wingdings" pitchFamily="2" charset="2"/>
               </a:rPr>
-              <a:t> major, minor… </a:t>
-            </a:r>
-            <a:endParaRPr lang="en-US" dirty="0">
-              <a:solidFill>
-                <a:schemeClr val="dk1"/>
-              </a:solidFill>
-            </a:endParaRPr>
-          </a:p>
-        </p:txBody>
-      </p:sp>
-      <p:sp>
-        <p:nvSpPr>
-          <p:cNvPr id="10" name="Rectangle 9"/>
+            </a:br>
+            <a:r>
+              <a:rPr lang="de-DE" dirty="0"/>
+              <a:t>:</a:t>
+            </a:r>
+            <a:r>
+              <a:rPr lang="de-DE" dirty="0" err="1"/>
+              <a:t>major</a:t>
+            </a:r>
+            <a:r>
+              <a:rPr lang="de-DE" dirty="0"/>
+              <a:t> 	:</a:t>
+            </a:r>
+            <a:r>
+              <a:rPr lang="de-DE" dirty="0" err="1"/>
+              <a:t>major_pentatonic</a:t>
+            </a:r>
+            <a:r>
+              <a:rPr lang="de-DE" dirty="0"/>
+              <a:t> 	:</a:t>
+            </a:r>
+            <a:r>
+              <a:rPr lang="de-DE" dirty="0" err="1"/>
+              <a:t>minor_pentatonic</a:t>
+            </a:r>
+            <a:r>
+              <a:rPr lang="de-DE" dirty="0"/>
+              <a:t> :minor</a:t>
+            </a:r>
+          </a:p>
+        </p:txBody>
+      </p:sp>
+      <p:sp>
+        <p:nvSpPr>
+          <p:cNvPr id="24" name="Rectangle 9">
+            <a:extLst>
+              <a:ext uri="{FF2B5EF4-FFF2-40B4-BE49-F238E27FC236}">
+                <a16:creationId xmlns:a16="http://schemas.microsoft.com/office/drawing/2014/main" id="{D7E977D0-068A-AD45-B1AC-8FA3365A3555}"/>
+              </a:ext>
+            </a:extLst>
+          </p:cNvPr>
           <p:cNvSpPr/>
           <p:nvPr/>
         </p:nvSpPr>
         <p:spPr>
           <a:xfrm>
-            <a:off x="1628800" y="971600"/>
+            <a:off x="308566" y="890300"/>
             <a:ext cx="856838" cy="369332"/>
           </a:xfrm>
           <a:prstGeom prst="rect">
@@ -5467,25 +5390,39 @@
           <a:lstStyle/>
           <a:p>
             <a:r>
+              <a:rPr lang="de-DE" dirty="0" err="1">
+                <a:solidFill>
+                  <a:schemeClr val="dk1"/>
+                </a:solidFill>
+              </a:rPr>
+              <a:t>play</a:t>
+            </a:r>
+            <a:r>
               <a:rPr lang="de-DE" dirty="0">
                 <a:solidFill>
                   <a:schemeClr val="dk1"/>
                 </a:solidFill>
               </a:rPr>
-              <a:t>play 60</a:t>
-            </a:r>
-          </a:p>
-        </p:txBody>
-      </p:sp>
-      <p:sp>
-        <p:nvSpPr>
-          <p:cNvPr id="11" name="Rectangle 10"/>
+              <a:t> 60</a:t>
+            </a:r>
+          </a:p>
+        </p:txBody>
+      </p:sp>
+      <p:sp>
+        <p:nvSpPr>
+          <p:cNvPr id="25" name="Rectangle 10">
+            <a:extLst>
+              <a:ext uri="{FF2B5EF4-FFF2-40B4-BE49-F238E27FC236}">
+                <a16:creationId xmlns:a16="http://schemas.microsoft.com/office/drawing/2014/main" id="{A4DD054C-5E0E-204C-9A84-0693BAE5FA51}"/>
+              </a:ext>
+            </a:extLst>
+          </p:cNvPr>
           <p:cNvSpPr/>
           <p:nvPr/>
         </p:nvSpPr>
         <p:spPr>
           <a:xfrm>
-            <a:off x="548680" y="5652120"/>
+            <a:off x="3125564" y="1150621"/>
             <a:ext cx="1459054" cy="369332"/>
           </a:xfrm>
           <a:prstGeom prst="rect">
@@ -5525,14 +5462,20 @@
       </p:sp>
       <p:sp>
         <p:nvSpPr>
-          <p:cNvPr id="12" name="Rectangle 11"/>
+          <p:cNvPr id="26" name="Rectangle 11">
+            <a:extLst>
+              <a:ext uri="{FF2B5EF4-FFF2-40B4-BE49-F238E27FC236}">
+                <a16:creationId xmlns:a16="http://schemas.microsoft.com/office/drawing/2014/main" id="{26067F5C-491C-6640-867C-76EAF18FF720}"/>
+              </a:ext>
+            </a:extLst>
+          </p:cNvPr>
           <p:cNvSpPr/>
           <p:nvPr/>
         </p:nvSpPr>
         <p:spPr>
           <a:xfrm>
-            <a:off x="260648" y="4139952"/>
-            <a:ext cx="4764125" cy="369332"/>
+            <a:off x="332656" y="3811877"/>
+            <a:ext cx="4764125" cy="646331"/>
           </a:xfrm>
           <a:prstGeom prst="rect">
             <a:avLst/>
@@ -5572,18 +5515,10 @@
                   <a:schemeClr val="dk1"/>
                 </a:solidFill>
               </a:rPr>
-              <a:t> </a:t>
-            </a:r>
-            <a:r>
-              <a:rPr lang="de-DE" dirty="0" smtClean="0">
-                <a:solidFill>
-                  <a:schemeClr val="dk1"/>
-                </a:solidFill>
-              </a:rPr>
-              <a:t>(</a:t>
-            </a:r>
-            <a:r>
-              <a:rPr lang="de-DE" dirty="0" err="1" smtClean="0">
+              <a:t> (</a:t>
+            </a:r>
+            <a:r>
+              <a:rPr lang="de-DE" dirty="0" err="1">
                 <a:solidFill>
                   <a:schemeClr val="dk1"/>
                 </a:solidFill>
@@ -5591,32 +5526,33 @@
               <a:t>scale</a:t>
             </a:r>
             <a:r>
-              <a:rPr lang="de-DE" dirty="0" smtClean="0">
+              <a:rPr lang="de-DE" dirty="0">
                 <a:solidFill>
                   <a:schemeClr val="dk1"/>
                 </a:solidFill>
               </a:rPr>
-              <a:t> :e4</a:t>
+              <a:t> :e4, :minor)</a:t>
+            </a:r>
+          </a:p>
+          <a:p>
+            <a:r>
+              <a:rPr lang="de-DE" dirty="0" err="1"/>
+              <a:t>play_pattern</a:t>
+            </a:r>
+            <a:r>
+              <a:rPr lang="de-DE" dirty="0"/>
+              <a:t> (</a:t>
+            </a:r>
+            <a:r>
+              <a:rPr lang="de-DE" dirty="0" err="1"/>
+              <a:t>scale</a:t>
+            </a:r>
+            <a:r>
+              <a:rPr lang="de-DE" dirty="0"/>
+              <a:t> :e4, :minor)</a:t>
             </a:r>
             <a:r>
               <a:rPr lang="de-DE" dirty="0">
-                <a:solidFill>
-                  <a:schemeClr val="dk1"/>
-                </a:solidFill>
-              </a:rPr>
-              <a:t>, :minor) </a:t>
-            </a:r>
-            <a:r>
-              <a:rPr lang="de-DE" dirty="0">
-                <a:solidFill>
-                  <a:schemeClr val="dk1"/>
-                </a:solidFill>
-                <a:sym typeface="Wingdings" pitchFamily="2" charset="2"/>
-              </a:rPr>
-              <a:t> </a:t>
-            </a:r>
-            <a:r>
-              <a:rPr lang="de-DE" dirty="0" smtClean="0">
                 <a:solidFill>
                   <a:schemeClr val="dk1"/>
                 </a:solidFill>
@@ -5625,7 +5561,7 @@
               <a:t>.</a:t>
             </a:r>
             <a:r>
-              <a:rPr lang="de-DE" dirty="0" err="1" smtClean="0">
+              <a:rPr lang="de-DE" dirty="0" err="1">
                 <a:solidFill>
                   <a:schemeClr val="dk1"/>
                 </a:solidFill>
@@ -5642,7 +5578,13 @@
       </p:sp>
       <p:sp>
         <p:nvSpPr>
-          <p:cNvPr id="13" name="Rectangle 12"/>
+          <p:cNvPr id="27" name="Rectangle 12">
+            <a:extLst>
+              <a:ext uri="{FF2B5EF4-FFF2-40B4-BE49-F238E27FC236}">
+                <a16:creationId xmlns:a16="http://schemas.microsoft.com/office/drawing/2014/main" id="{C47F7A9D-FEDD-FE46-85F4-E03497C7E18D}"/>
+              </a:ext>
+            </a:extLst>
+          </p:cNvPr>
           <p:cNvSpPr/>
           <p:nvPr/>
         </p:nvSpPr>
@@ -5676,7 +5618,7 @@
           <a:lstStyle/>
           <a:p>
             <a:r>
-              <a:rPr lang="de-DE" dirty="0">
+              <a:rPr lang="de-DE">
                 <a:solidFill>
                   <a:schemeClr val="dk1"/>
                 </a:solidFill>
@@ -5686,7 +5628,7 @@
           </a:p>
           <a:p>
             <a:r>
-              <a:rPr lang="de-DE" dirty="0">
+              <a:rPr lang="de-DE">
                 <a:solidFill>
                   <a:schemeClr val="dk1"/>
                 </a:solidFill>
@@ -5696,7 +5638,7 @@
           </a:p>
           <a:p>
             <a:r>
-              <a:rPr lang="de-DE" dirty="0">
+              <a:rPr lang="de-DE">
                 <a:solidFill>
                   <a:schemeClr val="dk1"/>
                 </a:solidFill>
@@ -5708,7 +5650,13 @@
       </p:sp>
       <p:sp>
         <p:nvSpPr>
-          <p:cNvPr id="14" name="Rectangle 13"/>
+          <p:cNvPr id="28" name="Rectangle 13">
+            <a:extLst>
+              <a:ext uri="{FF2B5EF4-FFF2-40B4-BE49-F238E27FC236}">
+                <a16:creationId xmlns:a16="http://schemas.microsoft.com/office/drawing/2014/main" id="{73585473-C930-4F4D-A323-346DD7FD4AFF}"/>
+              </a:ext>
+            </a:extLst>
+          </p:cNvPr>
           <p:cNvSpPr/>
           <p:nvPr/>
         </p:nvSpPr>
@@ -5747,15 +5695,15 @@
                   <a:schemeClr val="dk1"/>
                 </a:solidFill>
               </a:rPr>
-              <a:t>live_loop </a:t>
-            </a:r>
-            <a:r>
-              <a:rPr lang="de-DE" dirty="0" smtClean="0">
+              <a:t>live_loop :</a:t>
+            </a:r>
+            <a:r>
+              <a:rPr lang="de-DE" dirty="0" err="1">
                 <a:solidFill>
                   <a:schemeClr val="dk1"/>
                 </a:solidFill>
               </a:rPr>
-              <a:t>:myEndlessLoop </a:t>
+              <a:t>meineEndlosschleife</a:t>
             </a:r>
             <a:r>
               <a:rPr lang="de-DE" dirty="0">
@@ -5763,7 +5711,7 @@
                   <a:schemeClr val="dk1"/>
                 </a:solidFill>
               </a:rPr>
-              <a:t>do</a:t>
+              <a:t> do</a:t>
             </a:r>
           </a:p>
           <a:p>
@@ -5790,7 +5738,13 @@
       </p:sp>
       <p:sp>
         <p:nvSpPr>
-          <p:cNvPr id="15" name="Rectangle 14"/>
+          <p:cNvPr id="29" name="Rectangle 14">
+            <a:extLst>
+              <a:ext uri="{FF2B5EF4-FFF2-40B4-BE49-F238E27FC236}">
+                <a16:creationId xmlns:a16="http://schemas.microsoft.com/office/drawing/2014/main" id="{71FA7BE7-41BD-0748-8215-AC5D7C53DECA}"/>
+              </a:ext>
+            </a:extLst>
+          </p:cNvPr>
           <p:cNvSpPr/>
           <p:nvPr/>
         </p:nvSpPr>
@@ -5824,7 +5778,7 @@
           <a:lstStyle/>
           <a:p>
             <a:r>
-              <a:rPr lang="de-DE" dirty="0">
+              <a:rPr lang="de-DE">
                 <a:solidFill>
                   <a:schemeClr val="dk1"/>
                 </a:solidFill>
@@ -5832,7 +5786,7 @@
               <a:t>sample :bd_haus </a:t>
             </a:r>
             <a:r>
-              <a:rPr lang="de-DE" dirty="0">
+              <a:rPr lang="de-DE">
                 <a:solidFill>
                   <a:schemeClr val="dk1"/>
                 </a:solidFill>
@@ -5841,7 +5795,7 @@
               <a:t> </a:t>
             </a:r>
             <a:r>
-              <a:rPr lang="de-DE" dirty="0">
+              <a:rPr lang="de-DE">
                 <a:solidFill>
                   <a:schemeClr val="dk1"/>
                 </a:solidFill>
@@ -5849,7 +5803,7 @@
               <a:t>:guit_em9 ... </a:t>
             </a:r>
             <a:r>
-              <a:rPr lang="de-DE" dirty="0">
+              <a:rPr lang="de-DE">
                 <a:solidFill>
                   <a:schemeClr val="dk1"/>
                 </a:solidFill>
@@ -5857,7 +5811,7 @@
               </a:rPr>
               <a:t> </a:t>
             </a:r>
-            <a:endParaRPr lang="de-DE" dirty="0">
+            <a:endParaRPr lang="de-DE">
               <a:solidFill>
                 <a:schemeClr val="dk1"/>
               </a:solidFill>
@@ -5867,14 +5821,20 @@
       </p:sp>
       <p:sp>
         <p:nvSpPr>
-          <p:cNvPr id="16" name="Rectangle 15"/>
+          <p:cNvPr id="30" name="Rectangle 15">
+            <a:extLst>
+              <a:ext uri="{FF2B5EF4-FFF2-40B4-BE49-F238E27FC236}">
+                <a16:creationId xmlns:a16="http://schemas.microsoft.com/office/drawing/2014/main" id="{BF6E6B87-2412-EC44-ABAB-8CAFD4D6B328}"/>
+              </a:ext>
+            </a:extLst>
+          </p:cNvPr>
           <p:cNvSpPr/>
           <p:nvPr/>
         </p:nvSpPr>
         <p:spPr>
           <a:xfrm>
-            <a:off x="2602940" y="5546485"/>
-            <a:ext cx="3994412" cy="369332"/>
+            <a:off x="1753027" y="5546485"/>
+            <a:ext cx="4333177" cy="369332"/>
           </a:xfrm>
           <a:prstGeom prst="rect">
             <a:avLst/>
@@ -5901,12 +5861,36 @@
           <a:lstStyle/>
           <a:p>
             <a:r>
+              <a:rPr lang="de-DE" dirty="0" err="1">
+                <a:solidFill>
+                  <a:schemeClr val="dk1"/>
+                </a:solidFill>
+              </a:rPr>
+              <a:t>use_synth</a:t>
+            </a:r>
+            <a:r>
               <a:rPr lang="de-DE" dirty="0">
                 <a:solidFill>
                   <a:schemeClr val="dk1"/>
                 </a:solidFill>
               </a:rPr>
-              <a:t>use_synth :hollow </a:t>
+              <a:t> :</a:t>
+            </a:r>
+            <a:r>
+              <a:rPr lang="de-DE" dirty="0" err="1">
+                <a:solidFill>
+                  <a:schemeClr val="dk1"/>
+                </a:solidFill>
+              </a:rPr>
+              <a:t>hollow</a:t>
+            </a:r>
+            <a:r>
+              <a:rPr lang="de-DE" dirty="0">
+                <a:solidFill>
+                  <a:schemeClr val="dk1"/>
+                </a:solidFill>
+              </a:rPr>
+              <a:t> </a:t>
             </a:r>
             <a:r>
               <a:rPr lang="de-DE" dirty="0">
@@ -5915,10 +5899,28 @@
                 </a:solidFill>
                 <a:sym typeface="Wingdings" pitchFamily="2" charset="2"/>
               </a:rPr>
-              <a:t> saw, </a:t>
-            </a:r>
-            <a:r>
-              <a:rPr lang="de-DE" dirty="0" err="1" smtClean="0">
+              <a:t> :</a:t>
+            </a:r>
+            <a:r>
+              <a:rPr lang="de-DE" dirty="0" err="1">
+                <a:solidFill>
+                  <a:schemeClr val="dk1"/>
+                </a:solidFill>
+                <a:sym typeface="Wingdings" pitchFamily="2" charset="2"/>
+              </a:rPr>
+              <a:t>saw</a:t>
+            </a:r>
+            <a:r>
+              <a:rPr lang="de-DE" dirty="0">
+                <a:solidFill>
+                  <a:schemeClr val="dk1"/>
+                </a:solidFill>
+                <a:sym typeface="Wingdings" pitchFamily="2" charset="2"/>
+              </a:rPr>
+              <a:t>, :</a:t>
+            </a:r>
+            <a:r>
+              <a:rPr lang="de-DE" dirty="0" err="1">
                 <a:solidFill>
                   <a:schemeClr val="dk1"/>
                 </a:solidFill>
@@ -5927,13 +5929,13 @@
               <a:t>hoover</a:t>
             </a:r>
             <a:r>
-              <a:rPr lang="de-DE" dirty="0" smtClean="0">
+              <a:rPr lang="de-DE" dirty="0">
                 <a:sym typeface="Wingdings" pitchFamily="2" charset="2"/>
               </a:rPr>
-              <a:t>, piano</a:t>
-            </a:r>
-            <a:r>
-              <a:rPr lang="de-DE" dirty="0" smtClean="0">
+              <a:t>, :piano …</a:t>
+            </a:r>
+            <a:r>
+              <a:rPr lang="de-DE" dirty="0">
                 <a:solidFill>
                   <a:schemeClr val="dk1"/>
                 </a:solidFill>
@@ -5951,7 +5953,13 @@
       </p:sp>
       <p:sp>
         <p:nvSpPr>
-          <p:cNvPr id="17" name="Rectangle 16"/>
+          <p:cNvPr id="31" name="Rectangle 16">
+            <a:extLst>
+              <a:ext uri="{FF2B5EF4-FFF2-40B4-BE49-F238E27FC236}">
+                <a16:creationId xmlns:a16="http://schemas.microsoft.com/office/drawing/2014/main" id="{C48065E5-7B10-524F-A0AF-43D5EF394ECA}"/>
+              </a:ext>
+            </a:extLst>
+          </p:cNvPr>
           <p:cNvSpPr/>
           <p:nvPr/>
         </p:nvSpPr>
@@ -5985,11 +5993,11 @@
           <a:lstStyle/>
           <a:p>
             <a:r>
-              <a:rPr lang="de-DE" dirty="0" err="1"/>
+              <a:rPr lang="de-DE" err="1"/>
               <a:t>p</a:t>
             </a:r>
             <a:r>
-              <a:rPr lang="de-DE" dirty="0" err="1" smtClean="0">
+              <a:rPr lang="de-DE" err="1">
                 <a:solidFill>
                   <a:schemeClr val="dk1"/>
                 </a:solidFill>
@@ -5997,7 +6005,7 @@
               <a:t>lay</a:t>
             </a:r>
             <a:r>
-              <a:rPr lang="de-DE" dirty="0" smtClean="0">
+              <a:rPr lang="de-DE">
                 <a:solidFill>
                   <a:schemeClr val="dk1"/>
                 </a:solidFill>
@@ -6005,7 +6013,7 @@
               <a:t>                (</a:t>
             </a:r>
             <a:r>
-              <a:rPr lang="de-DE" dirty="0" err="1" smtClean="0">
+              <a:rPr lang="de-DE" err="1">
                 <a:solidFill>
                   <a:schemeClr val="dk1"/>
                 </a:solidFill>
@@ -6013,38 +6021,22 @@
               <a:t>scale</a:t>
             </a:r>
             <a:r>
-              <a:rPr lang="de-DE" dirty="0" smtClean="0">
+              <a:rPr lang="de-DE">
                 <a:solidFill>
                   <a:schemeClr val="dk1"/>
                 </a:solidFill>
               </a:rPr>
-              <a:t> :e4</a:t>
-            </a:r>
-            <a:r>
-              <a:rPr lang="de-DE" dirty="0">
-                <a:solidFill>
-                  <a:schemeClr val="dk1"/>
-                </a:solidFill>
-              </a:rPr>
-              <a:t>, :minor</a:t>
-            </a:r>
-            <a:r>
-              <a:rPr lang="de-DE" dirty="0" smtClean="0">
-                <a:solidFill>
-                  <a:schemeClr val="dk1"/>
-                </a:solidFill>
-              </a:rPr>
-              <a:t>).</a:t>
-            </a:r>
-            <a:r>
-              <a:rPr lang="de-DE" dirty="0" err="1" smtClean="0">
+              <a:t> :e4, :minor).</a:t>
+            </a:r>
+            <a:r>
+              <a:rPr lang="de-DE" err="1">
                 <a:solidFill>
                   <a:schemeClr val="dk1"/>
                 </a:solidFill>
               </a:rPr>
               <a:t>choose</a:t>
             </a:r>
-            <a:endParaRPr lang="de-DE" dirty="0">
+            <a:endParaRPr lang="de-DE">
               <a:solidFill>
                 <a:schemeClr val="dk1"/>
               </a:solidFill>
@@ -6062,13 +6054,6 @@
   <p:clrMapOvr>
     <a:masterClrMapping/>
   </p:clrMapOvr>
-  <p:timing>
-    <p:tnLst>
-      <p:par>
-        <p:cTn id="1" dur="indefinite" restart="never" nodeType="tmRoot"/>
-      </p:par>
-    </p:tnLst>
-  </p:timing>
 </p:sld>
 </file>
 
@@ -6132,7 +6117,7 @@
           <a:bodyPr rtlCol="0" anchor="ctr"/>
           <a:lstStyle/>
           <a:p>
-            <a:endParaRPr lang="en-US" dirty="0" smtClean="0">
+            <a:endParaRPr lang="en-US" dirty="0">
               <a:solidFill>
                 <a:schemeClr val="tx1"/>
               </a:solidFill>
@@ -6163,18 +6148,13 @@
           <a:lstStyle/>
           <a:p>
             <a:r>
-              <a:rPr lang="de-DE" sz="3200" dirty="0" smtClean="0">
+              <a:rPr lang="de-DE" sz="3200" dirty="0">
                 <a:solidFill>
                   <a:schemeClr val="accent6"/>
                 </a:solidFill>
               </a:rPr>
               <a:t>Cheat sheet</a:t>
             </a:r>
-            <a:endParaRPr lang="de-DE" sz="3200" dirty="0">
-              <a:solidFill>
-                <a:schemeClr val="accent6"/>
-              </a:solidFill>
-            </a:endParaRPr>
           </a:p>
         </p:txBody>
       </p:sp>
@@ -6201,7 +6181,7 @@
           <a:lstStyle/>
           <a:p>
             <a:r>
-              <a:rPr lang="de-DE" b="1" dirty="0" smtClean="0"/>
+              <a:rPr lang="de-DE" b="1" dirty="0"/>
               <a:t>Keyboard shortcuts</a:t>
             </a:r>
           </a:p>
@@ -6310,37 +6290,25 @@
           </a:lstStyle>
           <a:p>
             <a:r>
-              <a:rPr lang="de-DE" sz="1200" dirty="0" smtClean="0"/>
+              <a:rPr lang="de-DE" sz="1200" dirty="0"/>
               <a:t>ALT-R	Run 			ALT-A	Mark all</a:t>
             </a:r>
           </a:p>
           <a:p>
             <a:r>
-              <a:rPr lang="de-DE" sz="1200" dirty="0" smtClean="0"/>
-              <a:t>ALT-S	Stop</a:t>
-            </a:r>
-            <a:r>
               <a:rPr lang="de-DE" sz="1200" dirty="0"/>
-              <a:t>		</a:t>
-            </a:r>
-            <a:r>
-              <a:rPr lang="de-DE" sz="1200" dirty="0" smtClean="0"/>
-              <a:t>	ALT-C	Copy </a:t>
+              <a:t>ALT-S	Stop			ALT-C	Copy </a:t>
             </a:r>
           </a:p>
           <a:p>
             <a:r>
               <a:rPr lang="de-DE" sz="1200" dirty="0"/>
-              <a:t>	</a:t>
-            </a:r>
-            <a:r>
-              <a:rPr lang="de-DE" sz="1200" dirty="0" smtClean="0"/>
-              <a:t>			ALT-V	Insert</a:t>
-            </a:r>
-          </a:p>
-          <a:p>
-            <a:r>
-              <a:rPr lang="de-DE" sz="1200" dirty="0" smtClean="0"/>
+              <a:t>				ALT-V	Insert</a:t>
+            </a:r>
+          </a:p>
+          <a:p>
+            <a:r>
+              <a:rPr lang="de-DE" sz="1200" dirty="0"/>
               <a:t>STRG-I	Help for the current command</a:t>
             </a:r>
           </a:p>
@@ -6372,7 +6340,7 @@
           <a:lstStyle/>
           <a:p>
             <a:r>
-              <a:rPr lang="de-DE" b="1" dirty="0" smtClean="0"/>
+              <a:rPr lang="de-DE" b="1" dirty="0"/>
               <a:t>Buttons</a:t>
             </a:r>
           </a:p>
@@ -6505,10 +6473,9 @@
           </a:lstStyle>
           <a:p>
             <a:r>
-              <a:rPr lang="de-DE" sz="1200" dirty="0" smtClean="0"/>
+              <a:rPr lang="de-DE" sz="1200" dirty="0"/>
               <a:t>Decrease Text   Increase	  Format text in a nicer way</a:t>
             </a:r>
-            <a:endParaRPr lang="de-DE" sz="1200" dirty="0"/>
           </a:p>
         </p:txBody>
       </p:sp>
@@ -6559,10 +6526,9 @@
           <a:lstStyle/>
           <a:p>
             <a:r>
-              <a:rPr lang="de-DE" dirty="0" smtClean="0"/>
+              <a:rPr lang="de-DE" dirty="0"/>
               <a:t>Manual for at home</a:t>
             </a:r>
-            <a:endParaRPr lang="de-DE" dirty="0"/>
           </a:p>
         </p:txBody>
       </p:sp>
@@ -6622,10 +6588,9 @@
           <a:lstStyle/>
           <a:p>
             <a:r>
-              <a:rPr lang="de-DE" dirty="0" smtClean="0"/>
+              <a:rPr lang="de-DE" dirty="0"/>
               <a:t>Cool examples</a:t>
             </a:r>
-            <a:endParaRPr lang="de-DE" dirty="0"/>
           </a:p>
         </p:txBody>
       </p:sp>
@@ -6685,10 +6650,9 @@
           <a:lstStyle/>
           <a:p>
             <a:r>
-              <a:rPr lang="de-DE" dirty="0" smtClean="0"/>
+              <a:rPr lang="de-DE" dirty="0"/>
               <a:t>All commands</a:t>
             </a:r>
-            <a:endParaRPr lang="de-DE" dirty="0"/>
           </a:p>
         </p:txBody>
       </p:sp>
@@ -6750,10 +6714,9 @@
           <a:lstStyle/>
           <a:p>
             <a:r>
-              <a:rPr lang="de-DE" dirty="0" smtClean="0"/>
+              <a:rPr lang="de-DE" dirty="0"/>
               <a:t>Effects</a:t>
             </a:r>
-            <a:endParaRPr lang="de-DE" dirty="0"/>
           </a:p>
         </p:txBody>
       </p:sp>
@@ -6895,11 +6858,11 @@
           </a:lstStyle>
           <a:p>
             <a:r>
-              <a:rPr lang="de-DE" sz="1200" dirty="0" smtClean="0"/>
+              <a:rPr lang="de-DE" sz="1200" dirty="0"/>
               <a:t>Start Song	Stopp	  </a:t>
             </a:r>
             <a:r>
-              <a:rPr lang="de-DE" sz="1200" dirty="0" err="1" smtClean="0"/>
+              <a:rPr lang="de-DE" sz="1200" dirty="0" err="1"/>
               <a:t>Record</a:t>
             </a:r>
             <a:endParaRPr lang="de-DE" sz="1200" dirty="0"/>
@@ -7057,19 +7020,19 @@
           </a:lstStyle>
           <a:p>
             <a:r>
-              <a:rPr lang="de-DE" sz="1200" dirty="0" smtClean="0"/>
+              <a:rPr lang="de-DE" sz="1200" dirty="0"/>
               <a:t>  Save </a:t>
             </a:r>
             <a:r>
-              <a:rPr lang="de-DE" sz="1200" dirty="0" err="1" smtClean="0"/>
+              <a:rPr lang="de-DE" sz="1200" dirty="0" err="1"/>
               <a:t>song</a:t>
             </a:r>
             <a:r>
-              <a:rPr lang="de-DE" sz="1200" dirty="0" smtClean="0"/>
+              <a:rPr lang="de-DE" sz="1200" dirty="0"/>
               <a:t>        Load </a:t>
             </a:r>
             <a:r>
-              <a:rPr lang="de-DE" sz="1200" dirty="0" err="1" smtClean="0"/>
+              <a:rPr lang="de-DE" sz="1200" dirty="0" err="1"/>
               <a:t>song</a:t>
             </a:r>
             <a:endParaRPr lang="de-DE" sz="1200" dirty="0"/>
@@ -7086,13 +7049,6 @@
   <p:clrMapOvr>
     <a:masterClrMapping/>
   </p:clrMapOvr>
-  <p:timing>
-    <p:tnLst>
-      <p:par>
-        <p:cTn id="1" dur="indefinite" restart="never" nodeType="tmRoot"/>
-      </p:par>
-    </p:tnLst>
-  </p:timing>
 </p:sld>
 </file>
 
@@ -7156,7 +7112,7 @@
           <a:bodyPr rtlCol="0" anchor="ctr"/>
           <a:lstStyle/>
           <a:p>
-            <a:endParaRPr lang="en-US" dirty="0" smtClean="0">
+            <a:endParaRPr lang="en-US" dirty="0">
               <a:solidFill>
                 <a:schemeClr val="tx1"/>
               </a:solidFill>
@@ -7187,12 +7143,20 @@
           <a:lstStyle/>
           <a:p>
             <a:r>
-              <a:rPr lang="de-DE" sz="3200" dirty="0" smtClean="0">
+              <a:rPr lang="de-DE" sz="3200" dirty="0">
                 <a:solidFill>
                   <a:schemeClr val="accent6"/>
                 </a:solidFill>
               </a:rPr>
-              <a:t>Cheat sheet</a:t>
+              <a:t>Cheat </a:t>
+            </a:r>
+            <a:r>
+              <a:rPr lang="de-DE" sz="3200" dirty="0" err="1">
+                <a:solidFill>
+                  <a:schemeClr val="accent6"/>
+                </a:solidFill>
+              </a:rPr>
+              <a:t>sheet</a:t>
             </a:r>
             <a:endParaRPr lang="de-DE" sz="3200" dirty="0">
               <a:solidFill>
@@ -7225,14 +7189,13 @@
           <a:lstStyle/>
           <a:p>
             <a:r>
-              <a:rPr lang="de-DE" b="1" dirty="0" err="1" smtClean="0"/>
+              <a:rPr lang="de-DE" b="1" dirty="0" err="1"/>
               <a:t>use_synth</a:t>
             </a:r>
             <a:r>
               <a:rPr lang="de-DE" b="1" dirty="0"/>
               <a:t> </a:t>
             </a:r>
-            <a:endParaRPr lang="de-DE" b="1" dirty="0" smtClean="0"/>
           </a:p>
         </p:txBody>
       </p:sp>
@@ -7259,7 +7222,7 @@
           <a:lstStyle/>
           <a:p>
             <a:r>
-              <a:rPr lang="de-DE" b="1" dirty="0" smtClean="0"/>
+              <a:rPr lang="de-DE" b="1" dirty="0"/>
               <a:t>samples</a:t>
             </a:r>
           </a:p>
@@ -7765,7 +7728,7 @@
           <a:lstStyle/>
           <a:p>
             <a:r>
-              <a:rPr lang="en-US" sz="1050" dirty="0" smtClean="0"/>
+              <a:rPr lang="en-US" sz="1050" dirty="0"/>
               <a:t>:</a:t>
             </a:r>
             <a:r>
@@ -8720,14 +8683,14 @@
       </p:pic>
       <p:sp>
         <p:nvSpPr>
-          <p:cNvPr id="19" name="TextBox 18"/>
+          <p:cNvPr id="20" name="TextBox 19"/>
           <p:cNvSpPr txBox="1"/>
           <p:nvPr/>
         </p:nvSpPr>
         <p:spPr>
           <a:xfrm>
-            <a:off x="332657" y="1242789"/>
-            <a:ext cx="6264696" cy="1384995"/>
+            <a:off x="5428397" y="7041135"/>
+            <a:ext cx="1198801" cy="1384995"/>
           </a:xfrm>
           <a:prstGeom prst="rect">
             <a:avLst/>
@@ -8751,353 +8714,73 @@
           <a:bodyPr wrap="square" rtlCol="0">
             <a:spAutoFit/>
           </a:bodyPr>
-          <a:lstStyle>
-            <a:defPPr>
-              <a:defRPr lang="de-DE"/>
-            </a:defPPr>
-            <a:lvl1pPr>
-              <a:defRPr sz="1050">
-                <a:solidFill>
-                  <a:schemeClr val="dk1"/>
-                </a:solidFill>
-              </a:defRPr>
-            </a:lvl1pPr>
-            <a:lvl2pPr>
-              <a:defRPr>
-                <a:solidFill>
-                  <a:schemeClr val="dk1"/>
-                </a:solidFill>
-              </a:defRPr>
-            </a:lvl2pPr>
-            <a:lvl3pPr>
-              <a:defRPr>
-                <a:solidFill>
-                  <a:schemeClr val="dk1"/>
-                </a:solidFill>
-              </a:defRPr>
-            </a:lvl3pPr>
-            <a:lvl4pPr>
-              <a:defRPr>
-                <a:solidFill>
-                  <a:schemeClr val="dk1"/>
-                </a:solidFill>
-              </a:defRPr>
-            </a:lvl4pPr>
-            <a:lvl5pPr>
-              <a:defRPr>
-                <a:solidFill>
-                  <a:schemeClr val="dk1"/>
-                </a:solidFill>
-              </a:defRPr>
-            </a:lvl5pPr>
-            <a:lvl6pPr>
-              <a:defRPr>
-                <a:solidFill>
-                  <a:schemeClr val="dk1"/>
-                </a:solidFill>
-              </a:defRPr>
-            </a:lvl6pPr>
-            <a:lvl7pPr>
-              <a:defRPr>
-                <a:solidFill>
-                  <a:schemeClr val="dk1"/>
-                </a:solidFill>
-              </a:defRPr>
-            </a:lvl7pPr>
-            <a:lvl8pPr>
-              <a:defRPr>
-                <a:solidFill>
-                  <a:schemeClr val="dk1"/>
-                </a:solidFill>
-              </a:defRPr>
-            </a:lvl8pPr>
-            <a:lvl9pPr>
-              <a:defRPr>
-                <a:solidFill>
-                  <a:schemeClr val="dk1"/>
-                </a:solidFill>
-              </a:defRPr>
-            </a:lvl9pPr>
-          </a:lstStyle>
-          <a:p>
-            <a:r>
-              <a:rPr lang="de-DE" sz="1200" dirty="0" err="1"/>
-              <a:t>beep</a:t>
-            </a:r>
-            <a:r>
-              <a:rPr lang="de-DE" sz="1200" dirty="0"/>
-              <a:t>	blade	</a:t>
-            </a:r>
-            <a:r>
-              <a:rPr lang="de-DE" sz="1200" dirty="0" err="1"/>
-              <a:t>bnoise</a:t>
-            </a:r>
-            <a:r>
-              <a:rPr lang="de-DE" sz="1200" dirty="0"/>
-              <a:t>	</a:t>
-            </a:r>
-            <a:r>
-              <a:rPr lang="de-DE" sz="1200" dirty="0" err="1"/>
-              <a:t>cnoise</a:t>
-            </a:r>
-            <a:r>
-              <a:rPr lang="de-DE" sz="1200" dirty="0"/>
-              <a:t>	</a:t>
-            </a:r>
-            <a:r>
-              <a:rPr lang="de-DE" sz="1200" dirty="0" err="1"/>
-              <a:t>dark_ambience</a:t>
-            </a:r>
-            <a:r>
-              <a:rPr lang="de-DE" sz="1200" dirty="0"/>
-              <a:t> </a:t>
-            </a:r>
-          </a:p>
-          <a:p>
-            <a:r>
-              <a:rPr lang="de-DE" sz="1200" dirty="0" err="1"/>
-              <a:t>dpulse</a:t>
-            </a:r>
-            <a:r>
-              <a:rPr lang="de-DE" sz="1200" dirty="0"/>
-              <a:t>	</a:t>
-            </a:r>
-            <a:r>
-              <a:rPr lang="de-DE" sz="1200" dirty="0" err="1"/>
-              <a:t>dsaw</a:t>
-            </a:r>
-            <a:r>
-              <a:rPr lang="de-DE" sz="1200" dirty="0"/>
-              <a:t>	</a:t>
-            </a:r>
-            <a:r>
-              <a:rPr lang="de-DE" sz="1200" dirty="0" err="1"/>
-              <a:t>dull_bell</a:t>
-            </a:r>
-            <a:r>
-              <a:rPr lang="de-DE" sz="1200" dirty="0"/>
-              <a:t>	</a:t>
-            </a:r>
-            <a:r>
-              <a:rPr lang="de-DE" sz="1200" dirty="0" err="1"/>
-              <a:t>fm</a:t>
-            </a:r>
-            <a:r>
-              <a:rPr lang="de-DE" sz="1200" dirty="0"/>
-              <a:t>	</a:t>
-            </a:r>
-            <a:r>
-              <a:rPr lang="de-DE" sz="1200" dirty="0" err="1"/>
-              <a:t>gnoise</a:t>
-            </a:r>
-            <a:r>
-              <a:rPr lang="de-DE" sz="1200" dirty="0"/>
-              <a:t>	</a:t>
-            </a:r>
-            <a:r>
-              <a:rPr lang="de-DE" sz="1200" dirty="0" err="1"/>
-              <a:t>growl</a:t>
-            </a:r>
-            <a:endParaRPr lang="de-DE" sz="1200" dirty="0"/>
-          </a:p>
-          <a:p>
-            <a:r>
-              <a:rPr lang="de-DE" sz="1200" dirty="0" err="1"/>
-              <a:t>hollow</a:t>
-            </a:r>
-            <a:r>
-              <a:rPr lang="de-DE" sz="1200" dirty="0"/>
-              <a:t>	</a:t>
-            </a:r>
-            <a:r>
-              <a:rPr lang="de-DE" sz="1200" dirty="0" err="1"/>
-              <a:t>hoover</a:t>
-            </a:r>
-            <a:r>
-              <a:rPr lang="de-DE" sz="1200" dirty="0"/>
-              <a:t>	</a:t>
-            </a:r>
-          </a:p>
-          <a:p>
-            <a:r>
-              <a:rPr lang="de-DE" sz="1200" dirty="0" err="1"/>
-              <a:t>mod_beep</a:t>
-            </a:r>
-            <a:r>
-              <a:rPr lang="de-DE" sz="1200" dirty="0"/>
-              <a:t>	</a:t>
-            </a:r>
-            <a:r>
-              <a:rPr lang="de-DE" sz="1200" dirty="0" err="1"/>
-              <a:t>mod_dsaw</a:t>
-            </a:r>
-            <a:r>
-              <a:rPr lang="de-DE" sz="1200" dirty="0"/>
-              <a:t>	</a:t>
-            </a:r>
-            <a:r>
-              <a:rPr lang="de-DE" sz="1200" dirty="0" err="1"/>
-              <a:t>mod_fm</a:t>
-            </a:r>
-            <a:r>
-              <a:rPr lang="de-DE" sz="1200" dirty="0"/>
-              <a:t>	</a:t>
-            </a:r>
-            <a:r>
-              <a:rPr lang="de-DE" sz="1200" dirty="0" err="1" smtClean="0"/>
-              <a:t>chiplead</a:t>
-            </a:r>
-            <a:r>
-              <a:rPr lang="de-DE" sz="1200" dirty="0" smtClean="0"/>
-              <a:t>	</a:t>
-            </a:r>
-            <a:r>
-              <a:rPr lang="de-DE" sz="1200" dirty="0" err="1" smtClean="0"/>
-              <a:t>chipbass</a:t>
-            </a:r>
-            <a:r>
-              <a:rPr lang="de-DE" sz="1200" dirty="0" smtClean="0"/>
-              <a:t>	</a:t>
-            </a:r>
-            <a:r>
-              <a:rPr lang="de-DE" sz="1200" dirty="0" err="1" smtClean="0"/>
-              <a:t>chipnoise</a:t>
-            </a:r>
-            <a:endParaRPr lang="de-DE" sz="1200" dirty="0"/>
-          </a:p>
-          <a:p>
-            <a:r>
-              <a:rPr lang="de-DE" sz="1200" dirty="0" err="1"/>
-              <a:t>mod_pulse</a:t>
-            </a:r>
-            <a:r>
-              <a:rPr lang="de-DE" sz="1200" dirty="0"/>
-              <a:t>	</a:t>
-            </a:r>
-            <a:r>
-              <a:rPr lang="de-DE" sz="1200" dirty="0" err="1"/>
-              <a:t>mod_saw</a:t>
-            </a:r>
-            <a:r>
-              <a:rPr lang="de-DE" sz="1200" dirty="0"/>
-              <a:t>		</a:t>
-            </a:r>
-            <a:r>
-              <a:rPr lang="de-DE" sz="1200" dirty="0" err="1"/>
-              <a:t>mod_sine</a:t>
-            </a:r>
-            <a:r>
-              <a:rPr lang="de-DE" sz="1200" dirty="0"/>
-              <a:t>	</a:t>
-            </a:r>
-            <a:r>
-              <a:rPr lang="de-DE" sz="1200" dirty="0" err="1" smtClean="0"/>
-              <a:t>mod_tri</a:t>
-            </a:r>
-            <a:r>
-              <a:rPr lang="de-DE" sz="1200" dirty="0" smtClean="0"/>
-              <a:t>	pule</a:t>
-            </a:r>
-            <a:endParaRPr lang="de-DE" sz="1200" dirty="0"/>
-          </a:p>
-          <a:p>
-            <a:r>
-              <a:rPr lang="de-DE" sz="1200" dirty="0" err="1"/>
-              <a:t>noise</a:t>
-            </a:r>
-            <a:r>
-              <a:rPr lang="de-DE" sz="1200" dirty="0"/>
-              <a:t>	piano	</a:t>
-            </a:r>
-            <a:r>
-              <a:rPr lang="de-DE" sz="1200" dirty="0" err="1"/>
-              <a:t>pnoise</a:t>
-            </a:r>
-            <a:r>
-              <a:rPr lang="de-DE" sz="1200" dirty="0"/>
-              <a:t>	</a:t>
-            </a:r>
-            <a:r>
-              <a:rPr lang="de-DE" sz="1200" dirty="0" err="1"/>
-              <a:t>pretty_bell</a:t>
-            </a:r>
-            <a:r>
-              <a:rPr lang="de-DE" sz="1200" dirty="0"/>
-              <a:t>	</a:t>
-            </a:r>
-            <a:r>
-              <a:rPr lang="de-DE" sz="1200" dirty="0" err="1"/>
-              <a:t>prophet</a:t>
-            </a:r>
-            <a:r>
-              <a:rPr lang="de-DE" sz="1200" dirty="0"/>
-              <a:t>	</a:t>
-            </a:r>
-            <a:r>
-              <a:rPr lang="de-DE" sz="1200" dirty="0" err="1" smtClean="0"/>
-              <a:t>dtri</a:t>
-            </a:r>
-            <a:r>
-              <a:rPr lang="de-DE" sz="1200" dirty="0" smtClean="0"/>
-              <a:t>	</a:t>
-            </a:r>
-            <a:r>
-              <a:rPr lang="de-DE" sz="1200" dirty="0" err="1" smtClean="0"/>
-              <a:t>pluck</a:t>
-            </a:r>
-            <a:endParaRPr lang="de-DE" sz="1200" dirty="0"/>
-          </a:p>
-          <a:p>
-            <a:r>
-              <a:rPr lang="de-DE" sz="1200" dirty="0" err="1"/>
-              <a:t>saw</a:t>
-            </a:r>
-            <a:r>
-              <a:rPr lang="de-DE" sz="1200" dirty="0"/>
-              <a:t>	sine	</a:t>
-            </a:r>
-            <a:r>
-              <a:rPr lang="de-DE" sz="1200" dirty="0" err="1"/>
-              <a:t>square</a:t>
-            </a:r>
-            <a:r>
-              <a:rPr lang="de-DE" sz="1200" dirty="0"/>
-              <a:t>	</a:t>
-            </a:r>
-            <a:r>
-              <a:rPr lang="de-DE" sz="1200" dirty="0" err="1"/>
-              <a:t>subpulse</a:t>
-            </a:r>
-            <a:r>
-              <a:rPr lang="de-DE" sz="1200" dirty="0"/>
-              <a:t>	tb303	</a:t>
-            </a:r>
-            <a:r>
-              <a:rPr lang="de-DE" sz="1200" dirty="0" err="1"/>
-              <a:t>tri</a:t>
-            </a:r>
-            <a:r>
-              <a:rPr lang="de-DE" sz="1200" dirty="0"/>
-              <a:t>	</a:t>
-            </a:r>
-            <a:r>
-              <a:rPr lang="de-DE" sz="1200" dirty="0" err="1" smtClean="0"/>
-              <a:t>zawa</a:t>
-            </a:r>
-            <a:endParaRPr lang="de-DE" sz="1200" dirty="0"/>
-          </a:p>
-        </p:txBody>
-      </p:sp>
-      <p:sp>
-        <p:nvSpPr>
-          <p:cNvPr id="20" name="TextBox 19"/>
+          <a:lstStyle/>
+          <a:p>
+            <a:r>
+              <a:rPr lang="nl-NL" sz="1050" dirty="0"/>
+              <a:t>:drum_cowbell</a:t>
+            </a:r>
+          </a:p>
+          <a:p>
+            <a:r>
+              <a:rPr lang="nl-NL" sz="1050" dirty="0"/>
+              <a:t>:drum_roll</a:t>
+            </a:r>
+          </a:p>
+          <a:p>
+            <a:r>
+              <a:rPr lang="nl-NL" sz="1050" dirty="0"/>
+              <a:t>:misc_cros</a:t>
+            </a:r>
+          </a:p>
+          <a:p>
+            <a:r>
+              <a:rPr lang="nl-NL" sz="1050" dirty="0"/>
+              <a:t>:misc_cineboom</a:t>
+            </a:r>
+          </a:p>
+          <a:p>
+            <a:r>
+              <a:rPr lang="nl-NL" sz="1050" dirty="0"/>
+              <a:t>:perc_swash</a:t>
+            </a:r>
+          </a:p>
+          <a:p>
+            <a:r>
+              <a:rPr lang="nl-NL" sz="1050" dirty="0"/>
+              <a:t>:perc_till</a:t>
+            </a:r>
+          </a:p>
+          <a:p>
+            <a:r>
+              <a:rPr lang="nl-NL" sz="1050" dirty="0"/>
+              <a:t>:loop_safari</a:t>
+            </a:r>
+          </a:p>
+          <a:p>
+            <a:r>
+              <a:rPr lang="nl-NL" sz="1050" dirty="0"/>
+              <a:t>:loop_tabla</a:t>
+            </a:r>
+          </a:p>
+        </p:txBody>
+      </p:sp>
+      <p:sp>
+        <p:nvSpPr>
+          <p:cNvPr id="49" name="TextBox 4">
+            <a:extLst>
+              <a:ext uri="{FF2B5EF4-FFF2-40B4-BE49-F238E27FC236}">
+                <a16:creationId xmlns:a16="http://schemas.microsoft.com/office/drawing/2014/main" id="{49ED1C0B-F084-824C-B4B9-A499003A071D}"/>
+              </a:ext>
+            </a:extLst>
+          </p:cNvPr>
           <p:cNvSpPr txBox="1"/>
           <p:nvPr/>
         </p:nvSpPr>
         <p:spPr>
           <a:xfrm>
-            <a:off x="5428397" y="7041135"/>
-            <a:ext cx="1198801" cy="1384995"/>
+            <a:off x="307089" y="1271397"/>
+            <a:ext cx="6264696" cy="1384995"/>
           </a:xfrm>
           <a:prstGeom prst="rect">
             <a:avLst/>
@@ -9121,54 +8804,367 @@
           <a:bodyPr wrap="square" rtlCol="0">
             <a:spAutoFit/>
           </a:bodyPr>
-          <a:lstStyle/>
-          <a:p>
-            <a:r>
-              <a:rPr lang="nl-NL" sz="1050" dirty="0"/>
-              <a:t>:drum_cowbell</a:t>
-            </a:r>
-          </a:p>
-          <a:p>
-            <a:r>
-              <a:rPr lang="nl-NL" sz="1050" dirty="0"/>
-              <a:t>:drum_roll</a:t>
-            </a:r>
-          </a:p>
-          <a:p>
-            <a:r>
-              <a:rPr lang="nl-NL" sz="1050" dirty="0"/>
-              <a:t>:misc_cros</a:t>
-            </a:r>
-          </a:p>
-          <a:p>
-            <a:r>
-              <a:rPr lang="nl-NL" sz="1050" dirty="0"/>
-              <a:t>:misc_cineboom</a:t>
-            </a:r>
-          </a:p>
-          <a:p>
-            <a:r>
-              <a:rPr lang="nl-NL" sz="1050" dirty="0"/>
-              <a:t>:perc_swash</a:t>
-            </a:r>
-          </a:p>
-          <a:p>
-            <a:r>
-              <a:rPr lang="nl-NL" sz="1050" dirty="0"/>
-              <a:t>:perc_till</a:t>
-            </a:r>
-          </a:p>
-          <a:p>
-            <a:r>
-              <a:rPr lang="nl-NL" sz="1050" dirty="0"/>
-              <a:t>:loop_safari</a:t>
-            </a:r>
-          </a:p>
-          <a:p>
-            <a:r>
-              <a:rPr lang="nl-NL" sz="1050" dirty="0"/>
-              <a:t>:loop_tabla</a:t>
-            </a:r>
+          <a:lstStyle>
+            <a:defPPr>
+              <a:defRPr lang="de-DE"/>
+            </a:defPPr>
+            <a:lvl1pPr>
+              <a:defRPr sz="1050">
+                <a:solidFill>
+                  <a:schemeClr val="dk1"/>
+                </a:solidFill>
+              </a:defRPr>
+            </a:lvl1pPr>
+            <a:lvl2pPr>
+              <a:defRPr>
+                <a:solidFill>
+                  <a:schemeClr val="dk1"/>
+                </a:solidFill>
+              </a:defRPr>
+            </a:lvl2pPr>
+            <a:lvl3pPr>
+              <a:defRPr>
+                <a:solidFill>
+                  <a:schemeClr val="dk1"/>
+                </a:solidFill>
+              </a:defRPr>
+            </a:lvl3pPr>
+            <a:lvl4pPr>
+              <a:defRPr>
+                <a:solidFill>
+                  <a:schemeClr val="dk1"/>
+                </a:solidFill>
+              </a:defRPr>
+            </a:lvl4pPr>
+            <a:lvl5pPr>
+              <a:defRPr>
+                <a:solidFill>
+                  <a:schemeClr val="dk1"/>
+                </a:solidFill>
+              </a:defRPr>
+            </a:lvl5pPr>
+            <a:lvl6pPr>
+              <a:defRPr>
+                <a:solidFill>
+                  <a:schemeClr val="dk1"/>
+                </a:solidFill>
+              </a:defRPr>
+            </a:lvl6pPr>
+            <a:lvl7pPr>
+              <a:defRPr>
+                <a:solidFill>
+                  <a:schemeClr val="dk1"/>
+                </a:solidFill>
+              </a:defRPr>
+            </a:lvl7pPr>
+            <a:lvl8pPr>
+              <a:defRPr>
+                <a:solidFill>
+                  <a:schemeClr val="dk1"/>
+                </a:solidFill>
+              </a:defRPr>
+            </a:lvl8pPr>
+            <a:lvl9pPr>
+              <a:defRPr>
+                <a:solidFill>
+                  <a:schemeClr val="dk1"/>
+                </a:solidFill>
+              </a:defRPr>
+            </a:lvl9pPr>
+          </a:lstStyle>
+          <a:p>
+            <a:r>
+              <a:rPr lang="de-DE" sz="1200" dirty="0"/>
+              <a:t>:</a:t>
+            </a:r>
+            <a:r>
+              <a:rPr lang="de-DE" sz="1200" dirty="0" err="1"/>
+              <a:t>beep</a:t>
+            </a:r>
+            <a:r>
+              <a:rPr lang="de-DE" sz="1200" dirty="0"/>
+              <a:t>	:blade	:</a:t>
+            </a:r>
+            <a:r>
+              <a:rPr lang="de-DE" sz="1200" dirty="0" err="1"/>
+              <a:t>bnoise</a:t>
+            </a:r>
+            <a:r>
+              <a:rPr lang="de-DE" sz="1200" dirty="0"/>
+              <a:t>	:</a:t>
+            </a:r>
+            <a:r>
+              <a:rPr lang="de-DE" sz="1200" dirty="0" err="1"/>
+              <a:t>cnoise</a:t>
+            </a:r>
+            <a:r>
+              <a:rPr lang="de-DE" sz="1200" dirty="0"/>
+              <a:t>	:</a:t>
+            </a:r>
+            <a:r>
+              <a:rPr lang="de-DE" sz="1200" dirty="0" err="1"/>
+              <a:t>dark_ambience</a:t>
+            </a:r>
+            <a:r>
+              <a:rPr lang="de-DE" sz="1200" dirty="0"/>
+              <a:t> </a:t>
+            </a:r>
+          </a:p>
+          <a:p>
+            <a:r>
+              <a:rPr lang="de-DE" sz="1200" dirty="0"/>
+              <a:t>:</a:t>
+            </a:r>
+            <a:r>
+              <a:rPr lang="de-DE" sz="1200" dirty="0" err="1"/>
+              <a:t>dpulse</a:t>
+            </a:r>
+            <a:r>
+              <a:rPr lang="de-DE" sz="1200" dirty="0"/>
+              <a:t>	:</a:t>
+            </a:r>
+            <a:r>
+              <a:rPr lang="de-DE" sz="1200" dirty="0" err="1"/>
+              <a:t>dsaw</a:t>
+            </a:r>
+            <a:r>
+              <a:rPr lang="de-DE" sz="1200" dirty="0"/>
+              <a:t>	:</a:t>
+            </a:r>
+            <a:r>
+              <a:rPr lang="de-DE" sz="1200" dirty="0" err="1"/>
+              <a:t>dull_bell</a:t>
+            </a:r>
+            <a:r>
+              <a:rPr lang="de-DE" sz="1200" dirty="0"/>
+              <a:t>	:</a:t>
+            </a:r>
+            <a:r>
+              <a:rPr lang="de-DE" sz="1200" dirty="0" err="1"/>
+              <a:t>fm</a:t>
+            </a:r>
+            <a:r>
+              <a:rPr lang="de-DE" sz="1200" dirty="0"/>
+              <a:t>	:</a:t>
+            </a:r>
+            <a:r>
+              <a:rPr lang="de-DE" sz="1200" dirty="0" err="1"/>
+              <a:t>gnoise</a:t>
+            </a:r>
+            <a:r>
+              <a:rPr lang="de-DE" sz="1200" dirty="0"/>
+              <a:t>	:</a:t>
+            </a:r>
+            <a:r>
+              <a:rPr lang="de-DE" sz="1200" dirty="0" err="1"/>
+              <a:t>growl</a:t>
+            </a:r>
+            <a:endParaRPr lang="de-DE" sz="1200" dirty="0"/>
+          </a:p>
+          <a:p>
+            <a:r>
+              <a:rPr lang="de-DE" sz="1200" dirty="0"/>
+              <a:t>:</a:t>
+            </a:r>
+            <a:r>
+              <a:rPr lang="de-DE" sz="1200" dirty="0" err="1"/>
+              <a:t>hollow</a:t>
+            </a:r>
+            <a:r>
+              <a:rPr lang="de-DE" sz="1200" dirty="0"/>
+              <a:t>	:</a:t>
+            </a:r>
+            <a:r>
+              <a:rPr lang="de-DE" sz="1200" dirty="0" err="1"/>
+              <a:t>hoover</a:t>
+            </a:r>
+            <a:r>
+              <a:rPr lang="de-DE" sz="1200" dirty="0"/>
+              <a:t>	</a:t>
+            </a:r>
+          </a:p>
+          <a:p>
+            <a:r>
+              <a:rPr lang="de-DE" sz="1200" dirty="0"/>
+              <a:t>:</a:t>
+            </a:r>
+            <a:r>
+              <a:rPr lang="de-DE" sz="1200" dirty="0" err="1"/>
+              <a:t>mod_beep</a:t>
+            </a:r>
+            <a:r>
+              <a:rPr lang="de-DE" sz="1200" dirty="0"/>
+              <a:t>	:</a:t>
+            </a:r>
+            <a:r>
+              <a:rPr lang="de-DE" sz="1200" dirty="0" err="1"/>
+              <a:t>mod_dsaw</a:t>
+            </a:r>
+            <a:r>
+              <a:rPr lang="de-DE" sz="1200" dirty="0"/>
+              <a:t>	:</a:t>
+            </a:r>
+            <a:r>
+              <a:rPr lang="de-DE" sz="1200" dirty="0" err="1"/>
+              <a:t>mod_fm</a:t>
+            </a:r>
+            <a:r>
+              <a:rPr lang="de-DE" sz="1200" dirty="0"/>
+              <a:t>	:</a:t>
+            </a:r>
+            <a:r>
+              <a:rPr lang="de-DE" sz="1200" dirty="0" err="1"/>
+              <a:t>chiplead</a:t>
+            </a:r>
+            <a:r>
+              <a:rPr lang="de-DE" sz="1200" dirty="0"/>
+              <a:t>	:</a:t>
+            </a:r>
+            <a:r>
+              <a:rPr lang="de-DE" sz="1200" dirty="0" err="1"/>
+              <a:t>chipbass</a:t>
+            </a:r>
+            <a:r>
+              <a:rPr lang="de-DE" sz="1200" dirty="0"/>
+              <a:t>	:</a:t>
+            </a:r>
+            <a:r>
+              <a:rPr lang="de-DE" sz="1200" dirty="0" err="1"/>
+              <a:t>chipnoise</a:t>
+            </a:r>
+            <a:endParaRPr lang="de-DE" sz="1200" dirty="0"/>
+          </a:p>
+          <a:p>
+            <a:r>
+              <a:rPr lang="de-DE" sz="1200" dirty="0"/>
+              <a:t>:</a:t>
+            </a:r>
+            <a:r>
+              <a:rPr lang="de-DE" sz="1200" dirty="0" err="1"/>
+              <a:t>mod_pulse</a:t>
+            </a:r>
+            <a:r>
+              <a:rPr lang="de-DE" sz="1200" dirty="0"/>
+              <a:t>	:</a:t>
+            </a:r>
+            <a:r>
+              <a:rPr lang="de-DE" sz="1200" dirty="0" err="1"/>
+              <a:t>mod_saw</a:t>
+            </a:r>
+            <a:r>
+              <a:rPr lang="de-DE" sz="1200" dirty="0"/>
+              <a:t>		:</a:t>
+            </a:r>
+            <a:r>
+              <a:rPr lang="de-DE" sz="1200" dirty="0" err="1"/>
+              <a:t>mod_sine</a:t>
+            </a:r>
+            <a:r>
+              <a:rPr lang="de-DE" sz="1200" dirty="0"/>
+              <a:t>	:</a:t>
+            </a:r>
+            <a:r>
+              <a:rPr lang="de-DE" sz="1200" dirty="0" err="1"/>
+              <a:t>mod_tri</a:t>
+            </a:r>
+            <a:r>
+              <a:rPr lang="de-DE" sz="1200" dirty="0"/>
+              <a:t>	:pule</a:t>
+            </a:r>
+          </a:p>
+          <a:p>
+            <a:r>
+              <a:rPr lang="de-DE" sz="1200" dirty="0"/>
+              <a:t>:</a:t>
+            </a:r>
+            <a:r>
+              <a:rPr lang="de-DE" sz="1200" dirty="0" err="1"/>
+              <a:t>noise</a:t>
+            </a:r>
+            <a:r>
+              <a:rPr lang="de-DE" sz="1200" dirty="0"/>
+              <a:t>	:piano	:</a:t>
+            </a:r>
+            <a:r>
+              <a:rPr lang="de-DE" sz="1200" dirty="0" err="1"/>
+              <a:t>pnoise</a:t>
+            </a:r>
+            <a:r>
+              <a:rPr lang="de-DE" sz="1200" dirty="0"/>
+              <a:t>	:</a:t>
+            </a:r>
+            <a:r>
+              <a:rPr lang="de-DE" sz="1200" dirty="0" err="1"/>
+              <a:t>pretty_bell</a:t>
+            </a:r>
+            <a:r>
+              <a:rPr lang="de-DE" sz="1200" dirty="0"/>
+              <a:t>	:</a:t>
+            </a:r>
+            <a:r>
+              <a:rPr lang="de-DE" sz="1200" dirty="0" err="1"/>
+              <a:t>prophet</a:t>
+            </a:r>
+            <a:r>
+              <a:rPr lang="de-DE" sz="1200" dirty="0"/>
+              <a:t>	:</a:t>
+            </a:r>
+            <a:r>
+              <a:rPr lang="de-DE" sz="1200" dirty="0" err="1"/>
+              <a:t>dtri</a:t>
+            </a:r>
+            <a:r>
+              <a:rPr lang="de-DE" sz="1200" dirty="0"/>
+              <a:t>	:</a:t>
+            </a:r>
+            <a:r>
+              <a:rPr lang="de-DE" sz="1200" dirty="0" err="1"/>
+              <a:t>pluck</a:t>
+            </a:r>
+            <a:endParaRPr lang="de-DE" sz="1200" dirty="0"/>
+          </a:p>
+          <a:p>
+            <a:r>
+              <a:rPr lang="de-DE" sz="1200" dirty="0"/>
+              <a:t>:</a:t>
+            </a:r>
+            <a:r>
+              <a:rPr lang="de-DE" sz="1200" dirty="0" err="1"/>
+              <a:t>saw</a:t>
+            </a:r>
+            <a:r>
+              <a:rPr lang="de-DE" sz="1200" dirty="0"/>
+              <a:t>	:sine	:</a:t>
+            </a:r>
+            <a:r>
+              <a:rPr lang="de-DE" sz="1200" dirty="0" err="1"/>
+              <a:t>square</a:t>
+            </a:r>
+            <a:r>
+              <a:rPr lang="de-DE" sz="1200" dirty="0"/>
+              <a:t>	:</a:t>
+            </a:r>
+            <a:r>
+              <a:rPr lang="de-DE" sz="1200" dirty="0" err="1"/>
+              <a:t>subpulse</a:t>
+            </a:r>
+            <a:r>
+              <a:rPr lang="de-DE" sz="1200" dirty="0"/>
+              <a:t>	:tb303	:</a:t>
+            </a:r>
+            <a:r>
+              <a:rPr lang="de-DE" sz="1200" dirty="0" err="1"/>
+              <a:t>tri</a:t>
+            </a:r>
+            <a:r>
+              <a:rPr lang="de-DE" sz="1200" dirty="0"/>
+              <a:t>	:</a:t>
+            </a:r>
+            <a:r>
+              <a:rPr lang="de-DE" sz="1200" dirty="0" err="1"/>
+              <a:t>zawa</a:t>
+            </a:r>
+            <a:endParaRPr lang="de-DE" sz="1200" dirty="0"/>
           </a:p>
         </p:txBody>
       </p:sp>
@@ -9182,13 +9178,6 @@
   <p:clrMapOvr>
     <a:masterClrMapping/>
   </p:clrMapOvr>
-  <p:timing>
-    <p:tnLst>
-      <p:par>
-        <p:cTn id="1" dur="indefinite" restart="never" nodeType="tmRoot"/>
-      </p:par>
-    </p:tnLst>
-  </p:timing>
 </p:sld>
 </file>
 
@@ -9225,21 +9214,55 @@
           <a:lstStyle/>
           <a:p>
             <a:r>
-              <a:rPr lang="de-DE" dirty="0" smtClean="0"/>
+              <a:rPr lang="de-DE" dirty="0"/>
               <a:t>Play and wait</a:t>
             </a:r>
+          </a:p>
+        </p:txBody>
+      </p:sp>
+      <p:sp>
+        <p:nvSpPr>
+          <p:cNvPr id="28" name="Text Placeholder 27"/>
+          <p:cNvSpPr>
+            <a:spLocks noGrp="1"/>
+          </p:cNvSpPr>
+          <p:nvPr>
+            <p:ph type="body" sz="quarter" idx="18"/>
+          </p:nvPr>
+        </p:nvSpPr>
+        <p:spPr/>
+        <p:txBody>
+          <a:bodyPr/>
+          <a:lstStyle/>
+          <a:p>
+            <a:r>
+              <a:rPr lang="de-DE"/>
+              <a:t>80	60	62	64	65	20</a:t>
+            </a:r>
+          </a:p>
+          <a:p>
+            <a:r>
+              <a:rPr lang="de-DE"/>
+              <a:t>	67	69	71	72</a:t>
+            </a:r>
+          </a:p>
+          <a:p>
+            <a:r>
+              <a:rPr lang="de-DE"/>
+              <a:t>	:c4	:d4	:c5	:d5</a:t>
+            </a:r>
             <a:endParaRPr lang="de-DE" dirty="0"/>
           </a:p>
         </p:txBody>
       </p:sp>
       <p:sp>
         <p:nvSpPr>
-          <p:cNvPr id="28" name="Text Placeholder 27"/>
-          <p:cNvSpPr>
-            <a:spLocks noGrp="1"/>
-          </p:cNvSpPr>
-          <p:nvPr>
-            <p:ph type="body" sz="quarter" idx="18"/>
+          <p:cNvPr id="27" name="Text Placeholder 26"/>
+          <p:cNvSpPr>
+            <a:spLocks noGrp="1"/>
+          </p:cNvSpPr>
+          <p:nvPr>
+            <p:ph type="body" sz="quarter" idx="19"/>
           </p:nvPr>
         </p:nvSpPr>
         <p:spPr/>
@@ -9248,33 +9271,20 @@
           <a:lstStyle/>
           <a:p>
             <a:r>
-              <a:rPr lang="de-DE" smtClean="0"/>
-              <a:t>80	60	62	64	65	20</a:t>
-            </a:r>
-          </a:p>
-          <a:p>
-            <a:r>
-              <a:rPr lang="de-DE" smtClean="0"/>
-              <a:t>	67	69	71	72</a:t>
-            </a:r>
-          </a:p>
-          <a:p>
-            <a:r>
-              <a:rPr lang="de-DE" smtClean="0"/>
-              <a:t>	:c4	:d4	:c5	:d5</a:t>
-            </a:r>
-            <a:endParaRPr lang="de-DE" dirty="0"/>
-          </a:p>
-        </p:txBody>
-      </p:sp>
-      <p:sp>
-        <p:nvSpPr>
-          <p:cNvPr id="27" name="Text Placeholder 26"/>
-          <p:cNvSpPr>
-            <a:spLocks noGrp="1"/>
-          </p:cNvSpPr>
-          <p:nvPr>
-            <p:ph type="body" sz="quarter" idx="19"/>
+              <a:rPr lang="de-DE" dirty="0"/>
+              <a:t>	c5 e5 g5	  f4 a4 c5 	   g4 a4 d5</a:t>
+            </a:r>
+          </a:p>
+        </p:txBody>
+      </p:sp>
+      <p:sp>
+        <p:nvSpPr>
+          <p:cNvPr id="16" name="Text Placeholder 15"/>
+          <p:cNvSpPr>
+            <a:spLocks noGrp="1"/>
+          </p:cNvSpPr>
+          <p:nvPr>
+            <p:ph type="body" sz="quarter" idx="17"/>
           </p:nvPr>
         </p:nvSpPr>
         <p:spPr/>
@@ -9283,21 +9293,26 @@
           <a:lstStyle/>
           <a:p>
             <a:r>
-              <a:rPr lang="de-DE" dirty="0" smtClean="0"/>
-              <a:t>	c5 e5 g5	  f4 a4 c5 	   g4 a4 d5</a:t>
-            </a:r>
-            <a:endParaRPr lang="de-DE" dirty="0"/>
-          </a:p>
-        </p:txBody>
-      </p:sp>
-      <p:sp>
-        <p:nvSpPr>
-          <p:cNvPr id="16" name="Text Placeholder 15"/>
-          <p:cNvSpPr>
-            <a:spLocks noGrp="1"/>
-          </p:cNvSpPr>
-          <p:nvPr>
-            <p:ph type="body" sz="quarter" idx="17"/>
+              <a:rPr lang="de-DE" dirty="0"/>
+              <a:t>play 60</a:t>
+            </a:r>
+          </a:p>
+          <a:p>
+            <a:r>
+              <a:rPr lang="de-DE" dirty="0"/>
+              <a:t>sleep 1</a:t>
+            </a:r>
+          </a:p>
+        </p:txBody>
+      </p:sp>
+      <p:sp>
+        <p:nvSpPr>
+          <p:cNvPr id="30" name="Text Placeholder 29"/>
+          <p:cNvSpPr>
+            <a:spLocks noGrp="1"/>
+          </p:cNvSpPr>
+          <p:nvPr>
+            <p:ph type="body" sz="quarter" idx="20"/>
           </p:nvPr>
         </p:nvSpPr>
         <p:spPr/>
@@ -9306,39 +9321,9 @@
           <a:lstStyle/>
           <a:p>
             <a:r>
-              <a:rPr lang="de-DE" dirty="0" smtClean="0"/>
-              <a:t>play 60</a:t>
-            </a:r>
-          </a:p>
-          <a:p>
-            <a:r>
-              <a:rPr lang="de-DE" dirty="0" smtClean="0"/>
-              <a:t>sleep 1</a:t>
-            </a:r>
-            <a:endParaRPr lang="de-DE" dirty="0"/>
-          </a:p>
-        </p:txBody>
-      </p:sp>
-      <p:sp>
-        <p:nvSpPr>
-          <p:cNvPr id="30" name="Text Placeholder 29"/>
-          <p:cNvSpPr>
-            <a:spLocks noGrp="1"/>
-          </p:cNvSpPr>
-          <p:nvPr>
-            <p:ph type="body" sz="quarter" idx="20"/>
-          </p:nvPr>
-        </p:nvSpPr>
-        <p:spPr/>
-        <p:txBody>
-          <a:bodyPr/>
-          <a:lstStyle/>
-          <a:p>
-            <a:r>
-              <a:rPr lang="de-DE" dirty="0" smtClean="0"/>
+              <a:rPr lang="de-DE" dirty="0"/>
               <a:t>Play a chord (triad)</a:t>
             </a:r>
-            <a:endParaRPr lang="de-DE" dirty="0"/>
           </a:p>
         </p:txBody>
       </p:sp>
@@ -9363,28 +9348,27 @@
           <a:lstStyle/>
           <a:p>
             <a:r>
-              <a:rPr lang="en-US" dirty="0" smtClean="0"/>
+              <a:rPr lang="en-US" dirty="0"/>
               <a:t>play :c4 </a:t>
             </a:r>
           </a:p>
           <a:p>
             <a:r>
-              <a:rPr lang="en-US" dirty="0" smtClean="0"/>
+              <a:rPr lang="en-US" dirty="0"/>
               <a:t>play :e4</a:t>
             </a:r>
           </a:p>
           <a:p>
             <a:r>
-              <a:rPr lang="en-US" dirty="0" smtClean="0"/>
+              <a:rPr lang="en-US" dirty="0"/>
               <a:t>play :g4 </a:t>
             </a:r>
           </a:p>
           <a:p>
             <a:r>
-              <a:rPr lang="en-US" dirty="0" smtClean="0"/>
+              <a:rPr lang="en-US" dirty="0"/>
               <a:t>sleep 1</a:t>
             </a:r>
-            <a:endParaRPr lang="en-US" dirty="0"/>
           </a:p>
         </p:txBody>
       </p:sp>
@@ -9393,13 +9377,6 @@
   <p:clrMapOvr>
     <a:masterClrMapping/>
   </p:clrMapOvr>
-  <p:timing>
-    <p:tnLst>
-      <p:par>
-        <p:cTn id="1" dur="indefinite" restart="never" nodeType="tmRoot"/>
-      </p:par>
-    </p:tnLst>
-  </p:timing>
 </p:sld>
 </file>
 
@@ -9436,10 +9413,9 @@
           <a:lstStyle/>
           <a:p>
             <a:r>
-              <a:rPr lang="de-DE" dirty="0" smtClean="0"/>
+              <a:rPr lang="de-DE" dirty="0"/>
               <a:t>Use Buffer 1</a:t>
             </a:r>
-            <a:endParaRPr lang="de-DE" dirty="0"/>
           </a:p>
         </p:txBody>
       </p:sp>
@@ -9497,7 +9473,7 @@
           <a:lstStyle/>
           <a:p>
             <a:r>
-              <a:rPr lang="de-DE" smtClean="0"/>
+              <a:rPr lang="de-DE"/>
               <a:t>BUFFER 1</a:t>
             </a:r>
             <a:endParaRPr lang="de-DE" dirty="0"/>
@@ -9552,13 +9528,6 @@
   <p:clrMapOvr>
     <a:masterClrMapping/>
   </p:clrMapOvr>
-  <p:timing>
-    <p:tnLst>
-      <p:par>
-        <p:cTn id="1" dur="indefinite" restart="never" nodeType="tmRoot"/>
-      </p:par>
-    </p:tnLst>
-  </p:timing>
 </p:sld>
 </file>
 
@@ -9600,10 +9569,9 @@
           <a:lstStyle/>
           <a:p>
             <a:r>
-              <a:rPr lang="de-DE" dirty="0" smtClean="0"/>
+              <a:rPr lang="de-DE" dirty="0"/>
               <a:t>Multiple tones at the same time a re challed chords. This way is easier than before. It‘s a C-chord.</a:t>
             </a:r>
-            <a:endParaRPr lang="de-DE" dirty="0"/>
           </a:p>
         </p:txBody>
       </p:sp>
@@ -9623,10 +9591,9 @@
           <a:lstStyle/>
           <a:p>
             <a:r>
-              <a:rPr lang="de-DE" dirty="0" smtClean="0"/>
+              <a:rPr lang="de-DE" dirty="0"/>
               <a:t>	c5 e5 g5	  f4 a4 c5 	   g4 a4 d5</a:t>
             </a:r>
-            <a:endParaRPr lang="de-DE" dirty="0"/>
           </a:p>
         </p:txBody>
       </p:sp>
@@ -9651,16 +9618,15 @@
           <a:lstStyle/>
           <a:p>
             <a:r>
-              <a:rPr lang="de-DE" dirty="0" smtClean="0"/>
+              <a:rPr lang="de-DE" dirty="0"/>
               <a:t>	:a4	:b4	 :major7	:minor</a:t>
             </a:r>
           </a:p>
           <a:p>
             <a:r>
-              <a:rPr lang="de-DE" sz="1600" dirty="0" smtClean="0"/>
+              <a:rPr lang="de-DE" sz="1600" dirty="0"/>
               <a:t>                3 Chords with a second distance (use e, a and b minor)</a:t>
             </a:r>
-            <a:endParaRPr lang="de-DE" sz="1600" dirty="0"/>
           </a:p>
         </p:txBody>
       </p:sp>
@@ -9680,16 +9646,15 @@
           <a:lstStyle/>
           <a:p>
             <a:r>
-              <a:rPr lang="de-DE" dirty="0" smtClean="0"/>
+              <a:rPr lang="de-DE" dirty="0"/>
               <a:t>play_chord [:c4, :e4, :g4]</a:t>
             </a:r>
           </a:p>
           <a:p>
             <a:r>
-              <a:rPr lang="de-DE" dirty="0" smtClean="0"/>
+              <a:rPr lang="de-DE" dirty="0"/>
               <a:t>sleep 1</a:t>
             </a:r>
-            <a:endParaRPr lang="de-DE" dirty="0"/>
           </a:p>
         </p:txBody>
       </p:sp>
@@ -9709,10 +9674,9 @@
           <a:lstStyle/>
           <a:p>
             <a:r>
-              <a:rPr lang="de-DE" dirty="0" smtClean="0"/>
+              <a:rPr lang="de-DE" dirty="0"/>
               <a:t>Major , Minor  – Do you notice the difference?</a:t>
             </a:r>
-            <a:endParaRPr lang="de-DE" dirty="0"/>
           </a:p>
         </p:txBody>
       </p:sp>
@@ -9732,17 +9696,17 @@
           <a:lstStyle/>
           <a:p>
             <a:r>
-              <a:rPr lang="en-US" dirty="0" err="1" smtClean="0"/>
+              <a:rPr lang="en-US" dirty="0" err="1"/>
               <a:t>play_chord</a:t>
             </a:r>
             <a:r>
-              <a:rPr lang="en-US" dirty="0" smtClean="0"/>
+              <a:rPr lang="en-US" dirty="0"/>
               <a:t> chord(:e4, :major)</a:t>
             </a:r>
           </a:p>
           <a:p>
             <a:r>
-              <a:rPr lang="en-US" dirty="0" smtClean="0"/>
+              <a:rPr lang="en-US" dirty="0"/>
               <a:t>sleep 1</a:t>
             </a:r>
           </a:p>
@@ -9753,13 +9717,6 @@
   <p:clrMapOvr>
     <a:masterClrMapping/>
   </p:clrMapOvr>
-  <p:timing>
-    <p:tnLst>
-      <p:par>
-        <p:cTn id="1" dur="indefinite" restart="never" nodeType="tmRoot"/>
-      </p:par>
-    </p:tnLst>
-  </p:timing>
 </p:sld>
 </file>
 
@@ -9796,10 +9753,9 @@
           <a:lstStyle/>
           <a:p>
             <a:r>
-              <a:rPr lang="de-DE" dirty="0" smtClean="0"/>
+              <a:rPr lang="de-DE" dirty="0"/>
               <a:t>Use Buffer 2</a:t>
             </a:r>
-            <a:endParaRPr lang="de-DE" dirty="0"/>
           </a:p>
         </p:txBody>
       </p:sp>
@@ -9857,7 +9813,7 @@
           <a:lstStyle/>
           <a:p>
             <a:r>
-              <a:rPr lang="de-DE" smtClean="0"/>
+              <a:rPr lang="de-DE"/>
               <a:t>BUFFER 2</a:t>
             </a:r>
             <a:endParaRPr lang="de-DE" dirty="0"/>
@@ -9912,13 +9868,6 @@
   <p:clrMapOvr>
     <a:masterClrMapping/>
   </p:clrMapOvr>
-  <p:timing>
-    <p:tnLst>
-      <p:par>
-        <p:cTn id="1" dur="indefinite" restart="never" nodeType="tmRoot"/>
-      </p:par>
-    </p:tnLst>
-  </p:timing>
 </p:sld>
 </file>
 
@@ -9960,21 +9909,45 @@
           <a:lstStyle/>
           <a:p>
             <a:r>
-              <a:rPr lang="de-DE" dirty="0" smtClean="0"/>
+              <a:rPr lang="de-DE" dirty="0"/>
               <a:t>Play a a pattern (multiple tones in a sequence) – here we a play a scale</a:t>
             </a:r>
+          </a:p>
+        </p:txBody>
+      </p:sp>
+      <p:sp>
+        <p:nvSpPr>
+          <p:cNvPr id="15" name="Text Placeholder 14"/>
+          <p:cNvSpPr>
+            <a:spLocks noGrp="1"/>
+          </p:cNvSpPr>
+          <p:nvPr>
+            <p:ph type="body" sz="quarter" idx="18"/>
+          </p:nvPr>
+        </p:nvSpPr>
+        <p:spPr/>
+        <p:txBody>
+          <a:bodyPr/>
+          <a:lstStyle/>
+          <a:p>
+            <a:r>
+              <a:rPr lang="de-DE"/>
+              <a:t>:major 	:major_pentatonic 	:minor_pentatonic	:minor</a:t>
+            </a:r>
+          </a:p>
+          <a:p>
             <a:endParaRPr lang="de-DE" dirty="0"/>
           </a:p>
         </p:txBody>
       </p:sp>
       <p:sp>
         <p:nvSpPr>
-          <p:cNvPr id="15" name="Text Placeholder 14"/>
-          <p:cNvSpPr>
-            <a:spLocks noGrp="1"/>
-          </p:cNvSpPr>
-          <p:nvPr>
-            <p:ph type="body" sz="quarter" idx="18"/>
+          <p:cNvPr id="27" name="Text Placeholder 26"/>
+          <p:cNvSpPr>
+            <a:spLocks noGrp="1"/>
+          </p:cNvSpPr>
+          <p:nvPr>
+            <p:ph type="body" sz="quarter" idx="19"/>
           </p:nvPr>
         </p:nvSpPr>
         <p:spPr/>
@@ -9983,38 +9956,13 @@
           <a:lstStyle/>
           <a:p>
             <a:r>
-              <a:rPr lang="de-DE" smtClean="0"/>
-              <a:t>:major 	:major_pentatonic 	:minor_pentatonic	:minor</a:t>
-            </a:r>
-          </a:p>
-          <a:p>
-            <a:endParaRPr lang="de-DE" dirty="0"/>
-          </a:p>
-        </p:txBody>
-      </p:sp>
-      <p:sp>
-        <p:nvSpPr>
-          <p:cNvPr id="27" name="Text Placeholder 26"/>
-          <p:cNvSpPr>
-            <a:spLocks noGrp="1"/>
-          </p:cNvSpPr>
-          <p:nvPr>
-            <p:ph type="body" sz="quarter" idx="19"/>
-          </p:nvPr>
-        </p:nvSpPr>
-        <p:spPr/>
-        <p:txBody>
-          <a:bodyPr/>
-          <a:lstStyle/>
-          <a:p>
-            <a:r>
-              <a:rPr lang="de-DE" smtClean="0"/>
+              <a:rPr lang="de-DE"/>
               <a:t>50	240	400	100	600</a:t>
             </a:r>
           </a:p>
           <a:p>
             <a:r>
-              <a:rPr lang="de-DE" smtClean="0"/>
+              <a:rPr lang="de-DE"/>
               <a:t>:major 	:major_pentatonic 	:minor_pentatonic	:minor</a:t>
             </a:r>
             <a:endParaRPr lang="de-DE" dirty="0"/>
@@ -10042,30 +9990,29 @@
           <a:lstStyle/>
           <a:p>
             <a:r>
-              <a:rPr lang="de-DE" dirty="0" err="1" smtClean="0"/>
+              <a:rPr lang="de-DE" dirty="0" err="1"/>
               <a:t>play_pattern</a:t>
             </a:r>
             <a:r>
-              <a:rPr lang="de-DE" dirty="0" smtClean="0"/>
+              <a:rPr lang="de-DE" dirty="0"/>
               <a:t> (</a:t>
             </a:r>
             <a:r>
-              <a:rPr lang="de-DE" dirty="0" err="1" smtClean="0"/>
+              <a:rPr lang="de-DE" dirty="0" err="1"/>
               <a:t>scale</a:t>
             </a:r>
             <a:r>
-              <a:rPr lang="de-DE" dirty="0" smtClean="0"/>
+              <a:rPr lang="de-DE" dirty="0"/>
               <a:t> :c4, :</a:t>
             </a:r>
             <a:r>
-              <a:rPr lang="de-DE" dirty="0" err="1" smtClean="0"/>
+              <a:rPr lang="de-DE" dirty="0" err="1"/>
               <a:t>major</a:t>
             </a:r>
             <a:r>
-              <a:rPr lang="de-DE" dirty="0" smtClean="0"/>
+              <a:rPr lang="de-DE" dirty="0"/>
               <a:t>)</a:t>
             </a:r>
-            <a:endParaRPr lang="de-DE" dirty="0"/>
           </a:p>
         </p:txBody>
       </p:sp>
@@ -10085,10 +10032,9 @@
           <a:lstStyle/>
           <a:p>
             <a:r>
-              <a:rPr lang="de-DE" dirty="0" smtClean="0"/>
+              <a:rPr lang="de-DE" dirty="0"/>
               <a:t>Use a different speed. b p m = beats per minute</a:t>
             </a:r>
-            <a:endParaRPr lang="de-DE" dirty="0"/>
           </a:p>
         </p:txBody>
       </p:sp>
@@ -10113,32 +10059,31 @@
           <a:lstStyle/>
           <a:p>
             <a:r>
-              <a:rPr lang="de-DE" dirty="0" err="1" smtClean="0"/>
+              <a:rPr lang="de-DE" dirty="0" err="1"/>
               <a:t>use_bpm</a:t>
             </a:r>
             <a:r>
-              <a:rPr lang="de-DE" dirty="0" smtClean="0"/>
+              <a:rPr lang="de-DE" dirty="0"/>
               <a:t> 120</a:t>
             </a:r>
           </a:p>
           <a:p>
             <a:r>
-              <a:rPr lang="de-DE" dirty="0" err="1" smtClean="0"/>
+              <a:rPr lang="de-DE" dirty="0" err="1"/>
               <a:t>play_pattern</a:t>
             </a:r>
             <a:r>
-              <a:rPr lang="de-DE" dirty="0" smtClean="0"/>
+              <a:rPr lang="de-DE" dirty="0"/>
               <a:t> (</a:t>
             </a:r>
             <a:r>
-              <a:rPr lang="de-DE" dirty="0" err="1" smtClean="0"/>
+              <a:rPr lang="de-DE" dirty="0" err="1"/>
               <a:t>scale</a:t>
             </a:r>
             <a:r>
-              <a:rPr lang="de-DE" dirty="0" smtClean="0"/>
+              <a:rPr lang="de-DE" dirty="0"/>
               <a:t> :e4, :minor)</a:t>
             </a:r>
-            <a:endParaRPr lang="de-DE" dirty="0"/>
           </a:p>
         </p:txBody>
       </p:sp>
@@ -10147,13 +10092,6 @@
   <p:clrMapOvr>
     <a:masterClrMapping/>
   </p:clrMapOvr>
-  <p:timing>
-    <p:tnLst>
-      <p:par>
-        <p:cTn id="1" dur="indefinite" restart="never" nodeType="tmRoot"/>
-      </p:par>
-    </p:tnLst>
-  </p:timing>
 </p:sld>
 </file>
 
@@ -10190,33 +10128,32 @@
           <a:lstStyle/>
           <a:p>
             <a:r>
-              <a:rPr lang="de-DE" dirty="0" smtClean="0"/>
+              <a:rPr lang="de-DE" dirty="0"/>
               <a:t>2 times. We call this a loop.</a:t>
             </a:r>
+          </a:p>
+        </p:txBody>
+      </p:sp>
+      <p:sp>
+        <p:nvSpPr>
+          <p:cNvPr id="15" name="Text Placeholder 14"/>
+          <p:cNvSpPr>
+            <a:spLocks noGrp="1"/>
+          </p:cNvSpPr>
+          <p:nvPr>
+            <p:ph type="body" sz="quarter" idx="18"/>
+          </p:nvPr>
+        </p:nvSpPr>
+        <p:spPr/>
+        <p:txBody>
+          <a:bodyPr/>
+          <a:lstStyle/>
+          <a:p>
+            <a:r>
+              <a:rPr lang="de-DE"/>
+              <a:t>3.times	5.times</a:t>
+            </a:r>
             <a:endParaRPr lang="de-DE" dirty="0"/>
-          </a:p>
-        </p:txBody>
-      </p:sp>
-      <p:sp>
-        <p:nvSpPr>
-          <p:cNvPr id="15" name="Text Placeholder 14"/>
-          <p:cNvSpPr>
-            <a:spLocks noGrp="1"/>
-          </p:cNvSpPr>
-          <p:nvPr>
-            <p:ph type="body" sz="quarter" idx="18"/>
-          </p:nvPr>
-        </p:nvSpPr>
-        <p:spPr/>
-        <p:txBody>
-          <a:bodyPr/>
-          <a:lstStyle/>
-          <a:p>
-            <a:r>
-              <a:rPr lang="de-DE" smtClean="0"/>
-              <a:t>3.times	5.times</a:t>
-            </a:r>
-            <a:endParaRPr lang="de-DE" dirty="0" smtClean="0"/>
           </a:p>
         </p:txBody>
       </p:sp>
@@ -10241,7 +10178,7 @@
           <a:lstStyle/>
           <a:p>
             <a:r>
-              <a:rPr lang="de-DE" dirty="0" smtClean="0">
+              <a:rPr lang="de-DE" dirty="0">
                 <a:solidFill>
                   <a:srgbClr val="FF0000"/>
                 </a:solidFill>
@@ -10249,7 +10186,7 @@
               <a:t>Change to 480.</a:t>
             </a:r>
             <a:r>
-              <a:rPr lang="de-DE" dirty="0" smtClean="0"/>
+              <a:rPr lang="de-DE" dirty="0"/>
               <a:t>  Press Run and listen to when it changes. Immediately?</a:t>
             </a:r>
           </a:p>
@@ -10276,44 +10213,43 @@
           <a:lstStyle/>
           <a:p>
             <a:r>
-              <a:rPr lang="de-DE" dirty="0" smtClean="0"/>
+              <a:rPr lang="de-DE" dirty="0"/>
               <a:t>use_bpm 600</a:t>
             </a:r>
           </a:p>
           <a:p>
             <a:r>
-              <a:rPr lang="de-DE" dirty="0" smtClean="0"/>
+              <a:rPr lang="de-DE" dirty="0"/>
               <a:t>2.times do</a:t>
             </a:r>
           </a:p>
           <a:p>
             <a:r>
-              <a:rPr lang="de-DE" dirty="0" smtClean="0"/>
+              <a:rPr lang="de-DE" dirty="0"/>
               <a:t>   </a:t>
             </a:r>
             <a:r>
-              <a:rPr lang="de-DE" dirty="0" err="1" smtClean="0"/>
+              <a:rPr lang="de-DE" dirty="0" err="1"/>
               <a:t>play_pattern</a:t>
             </a:r>
             <a:r>
-              <a:rPr lang="de-DE" dirty="0" smtClean="0"/>
+              <a:rPr lang="de-DE" dirty="0"/>
               <a:t> (</a:t>
             </a:r>
             <a:r>
-              <a:rPr lang="de-DE" dirty="0" err="1" smtClean="0"/>
+              <a:rPr lang="de-DE" dirty="0" err="1"/>
               <a:t>scale</a:t>
             </a:r>
             <a:r>
-              <a:rPr lang="de-DE" dirty="0" smtClean="0"/>
+              <a:rPr lang="de-DE" dirty="0"/>
               <a:t> :e4, :minor)</a:t>
             </a:r>
           </a:p>
           <a:p>
             <a:r>
-              <a:rPr lang="de-DE" dirty="0" smtClean="0"/>
+              <a:rPr lang="de-DE" dirty="0"/>
               <a:t>end</a:t>
             </a:r>
-            <a:endParaRPr lang="de-DE" dirty="0"/>
           </a:p>
         </p:txBody>
       </p:sp>
@@ -10333,10 +10269,9 @@
           <a:lstStyle/>
           <a:p>
             <a:r>
-              <a:rPr lang="de-DE" dirty="0" smtClean="0"/>
+              <a:rPr lang="de-DE" dirty="0"/>
               <a:t>We call this an endless/infinite loop</a:t>
             </a:r>
-            <a:endParaRPr lang="de-DE" dirty="0"/>
           </a:p>
         </p:txBody>
       </p:sp>
@@ -10361,41 +10296,41 @@
           <a:lstStyle/>
           <a:p>
             <a:r>
-              <a:rPr lang="de-DE" dirty="0" smtClean="0"/>
+              <a:rPr lang="de-DE" dirty="0"/>
               <a:t>live_loop :tonleiter do</a:t>
             </a:r>
           </a:p>
           <a:p>
             <a:r>
-              <a:rPr lang="de-DE" dirty="0" smtClean="0"/>
+              <a:rPr lang="de-DE" dirty="0"/>
               <a:t>   use_bpm 120</a:t>
             </a:r>
           </a:p>
           <a:p>
             <a:r>
-              <a:rPr lang="de-DE" dirty="0" smtClean="0"/>
+              <a:rPr lang="de-DE" dirty="0"/>
               <a:t>   </a:t>
             </a:r>
             <a:r>
-              <a:rPr lang="de-DE" dirty="0" err="1" smtClean="0"/>
+              <a:rPr lang="de-DE" dirty="0" err="1"/>
               <a:t>play_pattern</a:t>
             </a:r>
             <a:r>
-              <a:rPr lang="de-DE" dirty="0" smtClean="0"/>
+              <a:rPr lang="de-DE" dirty="0"/>
               <a:t> (</a:t>
             </a:r>
             <a:r>
-              <a:rPr lang="de-DE" dirty="0" err="1" smtClean="0"/>
+              <a:rPr lang="de-DE" dirty="0" err="1"/>
               <a:t>scale</a:t>
             </a:r>
             <a:r>
-              <a:rPr lang="de-DE" dirty="0" smtClean="0"/>
+              <a:rPr lang="de-DE" dirty="0"/>
               <a:t> :e4, :minor)</a:t>
             </a:r>
           </a:p>
           <a:p>
             <a:r>
-              <a:rPr lang="de-DE" dirty="0" smtClean="0"/>
+              <a:rPr lang="de-DE" dirty="0"/>
               <a:t>end</a:t>
             </a:r>
           </a:p>
@@ -10541,13 +10476,6 @@
   <p:clrMapOvr>
     <a:masterClrMapping/>
   </p:clrMapOvr>
-  <p:timing>
-    <p:tnLst>
-      <p:par>
-        <p:cTn id="1" dur="indefinite" restart="never" nodeType="tmRoot"/>
-      </p:par>
-    </p:tnLst>
-  </p:timing>
 </p:sld>
 </file>
 
@@ -10584,10 +10512,9 @@
           <a:lstStyle/>
           <a:p>
             <a:r>
-              <a:rPr lang="de-DE" dirty="0" smtClean="0"/>
+              <a:rPr lang="de-DE" dirty="0"/>
               <a:t>How about a different sound for our synthesizer?</a:t>
             </a:r>
-            <a:endParaRPr lang="de-DE" dirty="0"/>
           </a:p>
         </p:txBody>
       </p:sp>
@@ -10613,32 +10540,24 @@
           <a:p>
             <a:r>
               <a:rPr lang="de-DE" dirty="0"/>
-              <a:t>:dsaw	:mod_dsaw	:</a:t>
-            </a:r>
-            <a:r>
-              <a:rPr lang="de-DE" dirty="0" smtClean="0"/>
-              <a:t>prophet		:piano</a:t>
-            </a:r>
-          </a:p>
-          <a:p>
-            <a:r>
-              <a:rPr lang="de-DE" dirty="0"/>
-              <a:t>:</a:t>
-            </a:r>
-            <a:r>
-              <a:rPr lang="de-DE" dirty="0" smtClean="0"/>
-              <a:t>blade	:tb303		:</a:t>
-            </a:r>
-            <a:r>
-              <a:rPr lang="de-DE" dirty="0" err="1" smtClean="0"/>
+              <a:t>:dsaw	:mod_dsaw	:prophet		:piano</a:t>
+            </a:r>
+          </a:p>
+          <a:p>
+            <a:r>
+              <a:rPr lang="de-DE" dirty="0"/>
+              <a:t>:blade	:tb303		:</a:t>
+            </a:r>
+            <a:r>
+              <a:rPr lang="de-DE" dirty="0" err="1"/>
               <a:t>pluck</a:t>
             </a:r>
             <a:r>
-              <a:rPr lang="de-DE" dirty="0" smtClean="0"/>
+              <a:rPr lang="de-DE" dirty="0"/>
               <a:t>		:</a:t>
             </a:r>
             <a:r>
-              <a:rPr lang="de-DE" dirty="0" err="1" smtClean="0"/>
+              <a:rPr lang="de-DE" dirty="0" err="1"/>
               <a:t>dtri</a:t>
             </a:r>
             <a:endParaRPr lang="de-DE" dirty="0"/>
@@ -10661,10 +10580,9 @@
           <a:lstStyle/>
           <a:p>
             <a:r>
-              <a:rPr lang="de-DE" dirty="0" smtClean="0"/>
+              <a:rPr lang="de-DE" dirty="0"/>
               <a:t>	</a:t>
             </a:r>
-            <a:endParaRPr lang="de-DE" dirty="0"/>
           </a:p>
         </p:txBody>
       </p:sp>
@@ -10684,10 +10602,9 @@
           <a:lstStyle/>
           <a:p>
             <a:r>
-              <a:rPr lang="de-DE" dirty="0" smtClean="0"/>
+              <a:rPr lang="de-DE" dirty="0"/>
               <a:t>And now we play the scale backwards</a:t>
             </a:r>
-            <a:endParaRPr lang="de-DE" dirty="0"/>
           </a:p>
         </p:txBody>
       </p:sp>
@@ -10711,45 +10628,45 @@
           <a:bodyPr/>
           <a:lstStyle/>
           <a:p>
-            <a:endParaRPr lang="de-DE" dirty="0" smtClean="0"/>
-          </a:p>
-          <a:p>
-            <a:r>
-              <a:rPr lang="de-DE" dirty="0" err="1" smtClean="0"/>
+            <a:endParaRPr lang="de-DE" dirty="0"/>
+          </a:p>
+          <a:p>
+            <a:r>
+              <a:rPr lang="de-DE" dirty="0" err="1"/>
               <a:t>play_pattern</a:t>
             </a:r>
             <a:r>
-              <a:rPr lang="de-DE" dirty="0" smtClean="0"/>
+              <a:rPr lang="de-DE" dirty="0"/>
               <a:t> (</a:t>
             </a:r>
             <a:r>
-              <a:rPr lang="de-DE" dirty="0" err="1" smtClean="0"/>
+              <a:rPr lang="de-DE" dirty="0" err="1"/>
               <a:t>scale</a:t>
             </a:r>
             <a:r>
-              <a:rPr lang="de-DE" dirty="0" smtClean="0"/>
+              <a:rPr lang="de-DE" dirty="0"/>
               <a:t> :e4, :minor)</a:t>
             </a:r>
           </a:p>
           <a:p>
             <a:r>
-              <a:rPr lang="de-DE" dirty="0" err="1" smtClean="0"/>
+              <a:rPr lang="de-DE" dirty="0" err="1"/>
               <a:t>play_pattern</a:t>
             </a:r>
             <a:r>
-              <a:rPr lang="de-DE" dirty="0" smtClean="0"/>
+              <a:rPr lang="de-DE" dirty="0"/>
               <a:t> (</a:t>
             </a:r>
             <a:r>
-              <a:rPr lang="de-DE" dirty="0" err="1" smtClean="0"/>
+              <a:rPr lang="de-DE" dirty="0" err="1"/>
               <a:t>scale</a:t>
             </a:r>
             <a:r>
-              <a:rPr lang="de-DE" dirty="0" smtClean="0"/>
+              <a:rPr lang="de-DE" dirty="0"/>
               <a:t> :e4, :minor).</a:t>
             </a:r>
             <a:r>
-              <a:rPr lang="de-DE" b="1" dirty="0" err="1" smtClean="0"/>
+              <a:rPr lang="de-DE" b="1" dirty="0" err="1"/>
               <a:t>reverse</a:t>
             </a:r>
             <a:endParaRPr lang="de-DE" b="1" dirty="0"/>
@@ -10776,15 +10693,15 @@
           <a:bodyPr/>
           <a:lstStyle/>
           <a:p>
-            <a:endParaRPr lang="de-DE" dirty="0" smtClean="0"/>
-          </a:p>
-          <a:p>
-            <a:r>
-              <a:rPr lang="de-DE" dirty="0" err="1" smtClean="0"/>
+            <a:endParaRPr lang="de-DE" dirty="0"/>
+          </a:p>
+          <a:p>
+            <a:r>
+              <a:rPr lang="de-DE" dirty="0" err="1"/>
               <a:t>use_synth</a:t>
             </a:r>
             <a:r>
-              <a:rPr lang="de-DE" dirty="0" smtClean="0"/>
+              <a:rPr lang="de-DE" dirty="0"/>
               <a:t> :saw</a:t>
             </a:r>
           </a:p>
@@ -10803,13 +10720,6 @@
   <p:clrMapOvr>
     <a:masterClrMapping/>
   </p:clrMapOvr>
-  <p:timing>
-    <p:tnLst>
-      <p:par>
-        <p:cTn id="1" dur="indefinite" restart="never" nodeType="tmRoot"/>
-      </p:par>
-    </p:tnLst>
-  </p:timing>
 </p:sld>
 </file>
 
@@ -10886,19 +10796,19 @@
               </a:tabLst>
             </a:pPr>
             <a:r>
-              <a:rPr lang="de-DE" sz="1600" b="0" i="1" dirty="0" smtClean="0"/>
+              <a:rPr lang="de-DE" sz="1600" b="0" i="1" dirty="0"/>
               <a:t>play</a:t>
             </a:r>
             <a:r>
-              <a:rPr lang="de-DE" sz="1600" b="0" dirty="0" smtClean="0"/>
+              <a:rPr lang="de-DE" sz="1600" b="0" dirty="0"/>
               <a:t> only plays one note (compare to </a:t>
             </a:r>
             <a:r>
-              <a:rPr lang="de-DE" sz="1600" b="0" i="1" dirty="0" smtClean="0"/>
+              <a:rPr lang="de-DE" sz="1600" b="0" i="1" dirty="0"/>
               <a:t>play_pattern</a:t>
             </a:r>
             <a:r>
-              <a:rPr lang="de-DE" sz="1600" b="0" dirty="0" smtClean="0"/>
+              <a:rPr lang="de-DE" sz="1600" b="0" dirty="0"/>
               <a:t> that plays many)</a:t>
             </a:r>
           </a:p>
@@ -10915,14 +10825,13 @@
               </a:tabLst>
             </a:pPr>
             <a:r>
-              <a:rPr lang="de-DE" sz="1600" b="0" i="1" dirty="0" smtClean="0"/>
+              <a:rPr lang="de-DE" sz="1600" b="0" i="1" dirty="0"/>
               <a:t>choose</a:t>
             </a:r>
             <a:r>
-              <a:rPr lang="de-DE" sz="1600" b="0" dirty="0" smtClean="0"/>
+              <a:rPr lang="de-DE" sz="1600" b="0" dirty="0"/>
               <a:t> selects a random one out of a set of notes</a:t>
             </a:r>
-            <a:endParaRPr lang="de-DE" sz="1600" b="0" dirty="0"/>
           </a:p>
         </p:txBody>
       </p:sp>
@@ -10947,13 +10856,8 @@
             </a:r>
             <a:r>
               <a:rPr lang="de-DE" dirty="0"/>
-              <a:t> </a:t>
-            </a:r>
-            <a:r>
-              <a:rPr lang="de-DE" dirty="0" smtClean="0"/>
-              <a:t>selects one tone randomly out of a set of tones. One a time only.</a:t>
-            </a:r>
-            <a:endParaRPr lang="de-DE" dirty="0"/>
+              <a:t> selects one tone randomly out of a set of tones. One a time only.</a:t>
+            </a:r>
           </a:p>
         </p:txBody>
       </p:sp>
@@ -10980,11 +10884,7 @@
             <a:pPr algn="ctr"/>
             <a:r>
               <a:rPr lang="de-DE" sz="4400" dirty="0"/>
-              <a:t>BUFFER </a:t>
-            </a:r>
-            <a:r>
-              <a:rPr lang="de-DE" sz="4400" dirty="0" smtClean="0"/>
-              <a:t>3</a:t>
+              <a:t>BUFFER 3</a:t>
             </a:r>
           </a:p>
         </p:txBody>
@@ -11015,39 +10915,30 @@
             </a:r>
             <a:r>
               <a:rPr lang="de-DE" sz="2400" dirty="0"/>
-              <a:t> </a:t>
-            </a:r>
-            <a:r>
-              <a:rPr lang="de-DE" sz="2400" dirty="0" smtClean="0"/>
-              <a:t>:</a:t>
-            </a:r>
-            <a:r>
-              <a:rPr lang="de-DE" sz="2400" dirty="0" err="1" smtClean="0"/>
+              <a:t> :</a:t>
+            </a:r>
+            <a:r>
+              <a:rPr lang="de-DE" sz="2400" dirty="0" err="1"/>
               <a:t>geblubber</a:t>
             </a:r>
             <a:r>
-              <a:rPr lang="de-DE" sz="2400" dirty="0" smtClean="0"/>
+              <a:rPr lang="de-DE" sz="2400" dirty="0"/>
               <a:t> do</a:t>
             </a:r>
-            <a:endParaRPr lang="de-DE" sz="2400" dirty="0"/>
           </a:p>
           <a:p>
             <a:r>
               <a:rPr lang="de-DE" sz="2400" dirty="0"/>
-              <a:t>   use_bpm </a:t>
-            </a:r>
-            <a:r>
-              <a:rPr lang="de-DE" sz="2400" dirty="0" smtClean="0"/>
-              <a:t>240</a:t>
-            </a:r>
-          </a:p>
-          <a:p>
-            <a:r>
-              <a:rPr lang="de-DE" sz="2400" dirty="0" smtClean="0"/>
+              <a:t>   use_bpm 240</a:t>
+            </a:r>
+          </a:p>
+          <a:p>
+            <a:r>
+              <a:rPr lang="de-DE" sz="2400" dirty="0"/>
               <a:t>   </a:t>
             </a:r>
             <a:r>
-              <a:rPr lang="de-DE" sz="2400" b="1" dirty="0" err="1" smtClean="0">
+              <a:rPr lang="de-DE" sz="2400" b="1" dirty="0" err="1">
                 <a:solidFill>
                   <a:srgbClr val="FF0000"/>
                 </a:solidFill>
@@ -11055,15 +10946,15 @@
               <a:t>play</a:t>
             </a:r>
             <a:r>
-              <a:rPr lang="de-DE" sz="2400" dirty="0" err="1" smtClean="0"/>
+              <a:rPr lang="de-DE" sz="2400" dirty="0" err="1"/>
               <a:t>_pattern</a:t>
             </a:r>
             <a:r>
-              <a:rPr lang="de-DE" sz="2400" dirty="0" smtClean="0"/>
+              <a:rPr lang="de-DE" sz="2400" dirty="0"/>
               <a:t> </a:t>
             </a:r>
             <a:r>
-              <a:rPr lang="de-DE" sz="2400" b="1" dirty="0" smtClean="0">
+              <a:rPr lang="de-DE" sz="2400" b="1" dirty="0">
                 <a:solidFill>
                   <a:srgbClr val="FF0000"/>
                 </a:solidFill>
@@ -11071,7 +10962,7 @@
               <a:t>(</a:t>
             </a:r>
             <a:r>
-              <a:rPr lang="de-DE" sz="2400" b="1" dirty="0" err="1" smtClean="0">
+              <a:rPr lang="de-DE" sz="2400" b="1" dirty="0" err="1">
                 <a:solidFill>
                   <a:srgbClr val="FF0000"/>
                 </a:solidFill>
@@ -11079,57 +10970,28 @@
               <a:t>scale</a:t>
             </a:r>
             <a:r>
-              <a:rPr lang="de-DE" sz="2400" b="1" dirty="0" smtClean="0">
+              <a:rPr lang="de-DE" sz="2400" b="1" dirty="0">
                 <a:solidFill>
                   <a:srgbClr val="FF0000"/>
                 </a:solidFill>
               </a:rPr>
-              <a:t> :e4</a:t>
-            </a:r>
-            <a:r>
-              <a:rPr lang="de-DE" sz="2400" b="1" dirty="0">
-                <a:solidFill>
-                  <a:srgbClr val="FF0000"/>
-                </a:solidFill>
-              </a:rPr>
-              <a:t>, :minor</a:t>
-            </a:r>
-            <a:r>
-              <a:rPr lang="de-DE" sz="2400" b="1" dirty="0" smtClean="0">
-                <a:solidFill>
-                  <a:srgbClr val="FF0000"/>
-                </a:solidFill>
-              </a:rPr>
-              <a:t>).</a:t>
-            </a:r>
-            <a:r>
-              <a:rPr lang="de-DE" sz="2400" b="1" dirty="0">
-                <a:solidFill>
-                  <a:srgbClr val="FF0000"/>
-                </a:solidFill>
-              </a:rPr>
-              <a:t>choose</a:t>
-            </a:r>
-          </a:p>
-          <a:p>
-            <a:r>
-              <a:rPr lang="de-DE" sz="2400" dirty="0" smtClean="0"/>
-              <a:t>   sleep </a:t>
-            </a:r>
+              <a:t> :e4, :minor).choose</a:t>
+            </a:r>
+          </a:p>
+          <a:p>
             <a:r>
               <a:rPr lang="de-DE" sz="2400" dirty="0"/>
-              <a:t>1</a:t>
-            </a:r>
-          </a:p>
-          <a:p>
-            <a:r>
-              <a:rPr lang="de-DE" sz="2400" dirty="0" smtClean="0"/>
+              <a:t>   sleep 1</a:t>
+            </a:r>
+          </a:p>
+          <a:p>
+            <a:r>
+              <a:rPr lang="de-DE" sz="2400" dirty="0"/>
               <a:t>end</a:t>
             </a:r>
-            <a:endParaRPr lang="de-DE" sz="2400" dirty="0"/>
-          </a:p>
-          <a:p>
-            <a:endParaRPr lang="de-DE" dirty="0" smtClean="0"/>
+          </a:p>
+          <a:p>
+            <a:endParaRPr lang="de-DE" dirty="0"/>
           </a:p>
         </p:txBody>
       </p:sp>
@@ -11222,13 +11084,6 @@
   <p:clrMapOvr>
     <a:masterClrMapping/>
   </p:clrMapOvr>
-  <p:timing>
-    <p:tnLst>
-      <p:par>
-        <p:cTn id="1" dur="indefinite" restart="never" nodeType="tmRoot"/>
-      </p:par>
-    </p:tnLst>
-  </p:timing>
 </p:sld>
 </file>
 

</xml_diff>